<commit_message>
missing section on latest slides added back
</commit_message>
<xml_diff>
--- a/slides.pptx
+++ b/slides.pptx
@@ -5,10 +5,10 @@
     <p:sldMasterId id="2147483648" r:id="rId4"/>
   </p:sldMasterIdLst>
   <p:notesMasterIdLst>
-    <p:notesMasterId r:id="rId41"/>
+    <p:notesMasterId r:id="rId42"/>
   </p:notesMasterIdLst>
   <p:handoutMasterIdLst>
-    <p:handoutMasterId r:id="rId42"/>
+    <p:handoutMasterId r:id="rId43"/>
   </p:handoutMasterIdLst>
   <p:sldIdLst>
     <p:sldId id="257" r:id="rId5"/>
@@ -32,21 +32,22 @@
     <p:sldId id="282" r:id="rId23"/>
     <p:sldId id="303" r:id="rId24"/>
     <p:sldId id="297" r:id="rId25"/>
-    <p:sldId id="271" r:id="rId26"/>
-    <p:sldId id="274" r:id="rId27"/>
-    <p:sldId id="295" r:id="rId28"/>
-    <p:sldId id="288" r:id="rId29"/>
-    <p:sldId id="283" r:id="rId30"/>
-    <p:sldId id="284" r:id="rId31"/>
-    <p:sldId id="298" r:id="rId32"/>
-    <p:sldId id="292" r:id="rId33"/>
-    <p:sldId id="280" r:id="rId34"/>
-    <p:sldId id="296" r:id="rId35"/>
-    <p:sldId id="289" r:id="rId36"/>
-    <p:sldId id="285" r:id="rId37"/>
-    <p:sldId id="286" r:id="rId38"/>
-    <p:sldId id="299" r:id="rId39"/>
-    <p:sldId id="260" r:id="rId40"/>
+    <p:sldId id="304" r:id="rId26"/>
+    <p:sldId id="271" r:id="rId27"/>
+    <p:sldId id="274" r:id="rId28"/>
+    <p:sldId id="295" r:id="rId29"/>
+    <p:sldId id="288" r:id="rId30"/>
+    <p:sldId id="283" r:id="rId31"/>
+    <p:sldId id="284" r:id="rId32"/>
+    <p:sldId id="298" r:id="rId33"/>
+    <p:sldId id="292" r:id="rId34"/>
+    <p:sldId id="280" r:id="rId35"/>
+    <p:sldId id="296" r:id="rId36"/>
+    <p:sldId id="289" r:id="rId37"/>
+    <p:sldId id="285" r:id="rId38"/>
+    <p:sldId id="286" r:id="rId39"/>
+    <p:sldId id="299" r:id="rId40"/>
+    <p:sldId id="260" r:id="rId41"/>
   </p:sldIdLst>
   <p:sldSz cx="9906000" cy="6858000" type="A4"/>
   <p:notesSz cx="9872663" cy="6797675"/>
@@ -971,6 +972,67 @@
 </file>
 
 <file path=ppt/notesSlides/notesSlide6.xml><?xml version="1.0" encoding="utf-8"?>
+<p:notes xmlns:a="http://schemas.openxmlformats.org/drawingml/2006/main" xmlns:r="http://schemas.openxmlformats.org/officeDocument/2006/relationships" xmlns:p="http://schemas.openxmlformats.org/presentationml/2006/main">
+  <p:cSld>
+    <p:spTree>
+      <p:nvGrpSpPr>
+        <p:cNvPr id="1" name=""/>
+        <p:cNvGrpSpPr/>
+        <p:nvPr/>
+      </p:nvGrpSpPr>
+      <p:grpSpPr>
+        <a:xfrm>
+          <a:off x="0" y="0"/>
+          <a:ext cx="0" cy="0"/>
+          <a:chOff x="0" y="0"/>
+          <a:chExt cx="0" cy="0"/>
+        </a:xfrm>
+      </p:grpSpPr>
+      <p:sp>
+        <p:nvSpPr>
+          <p:cNvPr id="2" name="Slide Image Placeholder 1"/>
+          <p:cNvSpPr>
+            <a:spLocks noGrp="1" noRot="1" noChangeAspect="1"/>
+          </p:cNvSpPr>
+          <p:nvPr>
+            <p:ph type="sldImg"/>
+          </p:nvPr>
+        </p:nvSpPr>
+        <p:spPr/>
+      </p:sp>
+      <p:sp>
+        <p:nvSpPr>
+          <p:cNvPr id="3" name="Notes Placeholder 2"/>
+          <p:cNvSpPr>
+            <a:spLocks noGrp="1"/>
+          </p:cNvSpPr>
+          <p:nvPr>
+            <p:ph type="body" idx="1"/>
+          </p:nvPr>
+        </p:nvSpPr>
+        <p:spPr/>
+        <p:txBody>
+          <a:bodyPr/>
+          <a:lstStyle/>
+          <a:p>
+            <a:endParaRPr lang="en-GB"/>
+          </a:p>
+        </p:txBody>
+      </p:sp>
+    </p:spTree>
+    <p:extLst>
+      <p:ext uri="{BB962C8B-B14F-4D97-AF65-F5344CB8AC3E}">
+        <p14:creationId xmlns:p14="http://schemas.microsoft.com/office/powerpoint/2010/main" val="3219540975"/>
+      </p:ext>
+    </p:extLst>
+  </p:cSld>
+  <p:clrMapOvr>
+    <a:masterClrMapping/>
+  </p:clrMapOvr>
+</p:notes>
+</file>
+
+<file path=ppt/notesSlides/notesSlide7.xml><?xml version="1.0" encoding="utf-8"?>
 <p:notes xmlns:a="http://schemas.openxmlformats.org/drawingml/2006/main" xmlns:r="http://schemas.openxmlformats.org/officeDocument/2006/relationships" xmlns:p="http://schemas.openxmlformats.org/presentationml/2006/main">
   <p:cSld>
     <p:spTree>
@@ -8057,12 +8119,6 @@
               </a:rPr>
               <a:t>Hands-on sessions</a:t>
             </a:r>
-            <a:endParaRPr lang="en-GB" sz="2400" smtClean="0">
-              <a:solidFill>
-                <a:srgbClr val="7030A0"/>
-              </a:solidFill>
-              <a:latin typeface="Century Gothic" panose="020B0502020202020204" pitchFamily="34" charset="0"/>
-            </a:endParaRPr>
           </a:p>
           <a:p>
             <a:endParaRPr lang="en-GB" sz="2400" smtClean="0">
@@ -8150,12 +8206,6 @@
               </a:rPr>
               <a:t>Nelle’s data</a:t>
             </a:r>
-            <a:endParaRPr lang="en-GB" sz="2400" smtClean="0">
-              <a:solidFill>
-                <a:srgbClr val="7030A0"/>
-              </a:solidFill>
-              <a:latin typeface="Century Gothic" panose="020B0502020202020204" pitchFamily="34" charset="0"/>
-            </a:endParaRPr>
           </a:p>
           <a:p>
             <a:endParaRPr lang="en-GB" sz="1600" smtClean="0">
@@ -8258,12 +8308,6 @@
               </a:rPr>
               <a:t>And Nelle’s data is in her home directory:</a:t>
             </a:r>
-            <a:endParaRPr lang="en-GB" sz="1600" smtClean="0">
-              <a:solidFill>
-                <a:schemeClr val="tx1"/>
-              </a:solidFill>
-              <a:latin typeface="Gill Sans MT" panose="020B0502020104020203" pitchFamily="34" charset="0"/>
-            </a:endParaRPr>
           </a:p>
           <a:p>
             <a:endParaRPr lang="en-GB" sz="1600">
@@ -8350,12 +8394,6 @@
               </a:rPr>
               <a:t>The problem:</a:t>
             </a:r>
-            <a:endParaRPr lang="en-GB" sz="2400" smtClean="0">
-              <a:solidFill>
-                <a:srgbClr val="7030A0"/>
-              </a:solidFill>
-              <a:latin typeface="Century Gothic" panose="020B0502020202020204" pitchFamily="34" charset="0"/>
-            </a:endParaRPr>
           </a:p>
           <a:p>
             <a:endParaRPr lang="en-GB" sz="2400" smtClean="0">
@@ -8887,25 +8925,7 @@
                   </a:solidFill>
                   <a:latin typeface="Gill Sans MT" panose="020B0502020104020203" pitchFamily="34" charset="0"/>
                 </a:rPr>
-                <a:t>Work through </a:t>
-              </a:r>
-              <a:r>
-                <a:rPr lang="en-GB" sz="1600" smtClean="0">
-                  <a:solidFill>
-                    <a:schemeClr val="tx1"/>
-                  </a:solidFill>
-                  <a:latin typeface="Gill Sans MT" panose="020B0502020104020203" pitchFamily="34" charset="0"/>
-                </a:rPr>
-                <a:t>sections I.2</a:t>
-              </a:r>
-              <a:r>
-                <a:rPr lang="en-GB" sz="1600" smtClean="0">
-                  <a:solidFill>
-                    <a:schemeClr val="tx1"/>
-                  </a:solidFill>
-                  <a:latin typeface="Gill Sans MT" panose="020B0502020104020203" pitchFamily="34" charset="0"/>
-                </a:rPr>
-                <a:t>, and I.3</a:t>
+                <a:t>Work through sections I.2, and I.3</a:t>
               </a:r>
             </a:p>
             <a:p>
@@ -9120,6 +9140,342 @@
           <a:chExt cx="0" cy="0"/>
         </a:xfrm>
       </p:grpSpPr>
+      <p:grpSp>
+        <p:nvGrpSpPr>
+          <p:cNvPr id="3" name="Group 2"/>
+          <p:cNvGrpSpPr/>
+          <p:nvPr/>
+        </p:nvGrpSpPr>
+        <p:grpSpPr>
+          <a:xfrm>
+            <a:off x="2073000" y="549000"/>
+            <a:ext cx="5760000" cy="5760000"/>
+            <a:chOff x="2793000" y="549000"/>
+            <a:chExt cx="5760000" cy="5760000"/>
+          </a:xfrm>
+        </p:grpSpPr>
+        <p:sp>
+          <p:nvSpPr>
+            <p:cNvPr id="4" name="Rectangle 3"/>
+            <p:cNvSpPr/>
+            <p:nvPr/>
+          </p:nvSpPr>
+          <p:spPr>
+            <a:xfrm>
+              <a:off x="2793000" y="549000"/>
+              <a:ext cx="5760000" cy="5760000"/>
+            </a:xfrm>
+            <a:prstGeom prst="rect">
+              <a:avLst/>
+            </a:prstGeom>
+            <a:solidFill>
+              <a:schemeClr val="bg1"/>
+            </a:solidFill>
+            <a:ln>
+              <a:solidFill>
+                <a:schemeClr val="tx2"/>
+              </a:solidFill>
+            </a:ln>
+            <a:effectLst>
+              <a:outerShdw blurRad="50800" dist="38100" dir="2700000" algn="tl" rotWithShape="0">
+                <a:prstClr val="black">
+                  <a:alpha val="40000"/>
+                </a:prstClr>
+              </a:outerShdw>
+            </a:effectLst>
+          </p:spPr>
+          <p:style>
+            <a:lnRef idx="2">
+              <a:schemeClr val="accent1">
+                <a:shade val="50000"/>
+              </a:schemeClr>
+            </a:lnRef>
+            <a:fillRef idx="1">
+              <a:schemeClr val="accent1"/>
+            </a:fillRef>
+            <a:effectRef idx="0">
+              <a:schemeClr val="accent1"/>
+            </a:effectRef>
+            <a:fontRef idx="minor">
+              <a:schemeClr val="lt1"/>
+            </a:fontRef>
+          </p:style>
+          <p:txBody>
+            <a:bodyPr lIns="180000" tIns="180000" rIns="180000" bIns="180000" rtlCol="0" anchor="t"/>
+            <a:lstStyle/>
+            <a:p>
+              <a:pPr algn="ctr"/>
+              <a:endParaRPr lang="en-GB" sz="4800" smtClean="0">
+                <a:solidFill>
+                  <a:schemeClr val="tx2"/>
+                </a:solidFill>
+                <a:latin typeface="Century Gothic" panose="020B0502020202020204" pitchFamily="34" charset="0"/>
+              </a:endParaRPr>
+            </a:p>
+            <a:p>
+              <a:pPr algn="ctr"/>
+              <a:r>
+                <a:rPr lang="en-GB" sz="3600" smtClean="0">
+                  <a:solidFill>
+                    <a:schemeClr val="tx2"/>
+                  </a:solidFill>
+                  <a:latin typeface="Century Gothic" panose="020B0502020202020204" pitchFamily="34" charset="0"/>
+                </a:rPr>
+                <a:t>Session II</a:t>
+              </a:r>
+            </a:p>
+            <a:p>
+              <a:pPr algn="ctr"/>
+              <a:endParaRPr lang="en-GB" sz="3600">
+                <a:solidFill>
+                  <a:schemeClr val="tx2"/>
+                </a:solidFill>
+                <a:latin typeface="Century Gothic" panose="020B0502020202020204" pitchFamily="34" charset="0"/>
+              </a:endParaRPr>
+            </a:p>
+            <a:p>
+              <a:pPr algn="ctr"/>
+              <a:r>
+                <a:rPr lang="en-GB" sz="2400" smtClean="0">
+                  <a:solidFill>
+                    <a:srgbClr val="7030A0"/>
+                  </a:solidFill>
+                  <a:latin typeface="Century Gothic" panose="020B0502020202020204" pitchFamily="34" charset="0"/>
+                </a:rPr>
+                <a:t>Pipes and filters</a:t>
+              </a:r>
+            </a:p>
+            <a:p>
+              <a:pPr algn="ctr"/>
+              <a:endParaRPr lang="en-GB" sz="2400" smtClean="0">
+                <a:solidFill>
+                  <a:srgbClr val="7030A0"/>
+                </a:solidFill>
+                <a:latin typeface="Century Gothic" panose="020B0502020202020204" pitchFamily="34" charset="0"/>
+              </a:endParaRPr>
+            </a:p>
+            <a:p>
+              <a:pPr algn="ctr"/>
+              <a:r>
+                <a:rPr lang="en-GB" sz="2400" smtClean="0">
+                  <a:solidFill>
+                    <a:srgbClr val="7030A0"/>
+                  </a:solidFill>
+                  <a:latin typeface="Century Gothic" panose="020B0502020202020204" pitchFamily="34" charset="0"/>
+                </a:rPr>
+                <a:t>Finding things</a:t>
+              </a:r>
+            </a:p>
+            <a:p>
+              <a:pPr algn="ctr"/>
+              <a:endParaRPr lang="en-GB" sz="2400">
+                <a:solidFill>
+                  <a:srgbClr val="7030A0"/>
+                </a:solidFill>
+                <a:latin typeface="Century Gothic" panose="020B0502020202020204" pitchFamily="34" charset="0"/>
+              </a:endParaRPr>
+            </a:p>
+            <a:p>
+              <a:pPr algn="ctr"/>
+              <a:r>
+                <a:rPr lang="en-GB" sz="2400" smtClean="0">
+                  <a:solidFill>
+                    <a:srgbClr val="7030A0"/>
+                  </a:solidFill>
+                  <a:latin typeface="Century Gothic" panose="020B0502020202020204" pitchFamily="34" charset="0"/>
+                </a:rPr>
+                <a:t>Practical session</a:t>
+              </a:r>
+            </a:p>
+            <a:p>
+              <a:pPr algn="ctr"/>
+              <a:endParaRPr lang="en-GB" sz="2400">
+                <a:solidFill>
+                  <a:srgbClr val="7030A0"/>
+                </a:solidFill>
+                <a:latin typeface="Century Gothic" panose="020B0502020202020204" pitchFamily="34" charset="0"/>
+              </a:endParaRPr>
+            </a:p>
+            <a:p>
+              <a:pPr algn="ctr"/>
+              <a:r>
+                <a:rPr lang="en-GB" sz="3600">
+                  <a:latin typeface="Gill Sans MT" panose="020B0502020104020203" pitchFamily="34" charset="0"/>
+                </a:rPr>
+                <a:t>etc</a:t>
+              </a:r>
+              <a:endParaRPr lang="en-GB" sz="3600"/>
+            </a:p>
+          </p:txBody>
+        </p:sp>
+        <p:pic>
+          <p:nvPicPr>
+            <p:cNvPr id="6" name="Picture 2" descr="C:\Users\maccal02\Desktop\templates\cr-ci logos\CRUK_CAMBRIDGE_I_Pos_RGB_300.jpg"/>
+            <p:cNvPicPr>
+              <a:picLocks noChangeAspect="1" noChangeArrowheads="1"/>
+            </p:cNvPicPr>
+            <p:nvPr/>
+          </p:nvPicPr>
+          <p:blipFill>
+            <a:blip r:embed="rId3" cstate="print">
+              <a:extLst>
+                <a:ext uri="{28A0092B-C50C-407E-A947-70E740481C1C}">
+                  <a14:useLocalDpi xmlns:a14="http://schemas.microsoft.com/office/drawing/2010/main" val="0"/>
+                </a:ext>
+              </a:extLst>
+            </a:blip>
+            <a:srcRect/>
+            <a:stretch>
+              <a:fillRect/>
+            </a:stretch>
+          </p:blipFill>
+          <p:spPr bwMode="auto">
+            <a:xfrm>
+              <a:off x="2929800" y="732409"/>
+              <a:ext cx="2743200" cy="604387"/>
+            </a:xfrm>
+            <a:prstGeom prst="rect">
+              <a:avLst/>
+            </a:prstGeom>
+            <a:noFill/>
+            <a:extLst>
+              <a:ext uri="{909E8E84-426E-40DD-AFC4-6F175D3DCCD1}">
+                <a14:hiddenFill xmlns:a14="http://schemas.microsoft.com/office/drawing/2010/main">
+                  <a:solidFill>
+                    <a:srgbClr val="FFFFFF"/>
+                  </a:solidFill>
+                </a14:hiddenFill>
+              </a:ext>
+            </a:extLst>
+          </p:spPr>
+        </p:pic>
+        <p:pic>
+          <p:nvPicPr>
+            <p:cNvPr id="1026" name="Picture 2" descr="C:\Users\maccal02\Desktop\templates\uoc-mono.jpg"/>
+            <p:cNvPicPr>
+              <a:picLocks noChangeAspect="1" noChangeArrowheads="1"/>
+            </p:cNvPicPr>
+            <p:nvPr/>
+          </p:nvPicPr>
+          <p:blipFill>
+            <a:blip r:embed="rId4" cstate="print">
+              <a:extLst>
+                <a:ext uri="{28A0092B-C50C-407E-A947-70E740481C1C}">
+                  <a14:useLocalDpi xmlns:a14="http://schemas.microsoft.com/office/drawing/2010/main" val="0"/>
+                </a:ext>
+              </a:extLst>
+            </a:blip>
+            <a:srcRect/>
+            <a:stretch>
+              <a:fillRect/>
+            </a:stretch>
+          </p:blipFill>
+          <p:spPr bwMode="auto">
+            <a:xfrm>
+              <a:off x="6140847" y="5600700"/>
+              <a:ext cx="2120106" cy="457200"/>
+            </a:xfrm>
+            <a:prstGeom prst="rect">
+              <a:avLst/>
+            </a:prstGeom>
+            <a:noFill/>
+            <a:extLst>
+              <a:ext uri="{909E8E84-426E-40DD-AFC4-6F175D3DCCD1}">
+                <a14:hiddenFill xmlns:a14="http://schemas.microsoft.com/office/drawing/2010/main">
+                  <a:solidFill>
+                    <a:srgbClr val="FFFFFF"/>
+                  </a:solidFill>
+                </a14:hiddenFill>
+              </a:ext>
+            </a:extLst>
+          </p:spPr>
+        </p:pic>
+        <p:sp>
+          <p:nvSpPr>
+            <p:cNvPr id="2" name="Rectangle 1"/>
+            <p:cNvSpPr/>
+            <p:nvPr/>
+          </p:nvSpPr>
+          <p:spPr>
+            <a:xfrm>
+              <a:off x="6019800" y="5486400"/>
+              <a:ext cx="2362200" cy="685800"/>
+            </a:xfrm>
+            <a:prstGeom prst="rect">
+              <a:avLst/>
+            </a:prstGeom>
+            <a:solidFill>
+              <a:srgbClr val="FFFFFF">
+                <a:alpha val="74902"/>
+              </a:srgbClr>
+            </a:solidFill>
+            <a:ln>
+              <a:noFill/>
+            </a:ln>
+          </p:spPr>
+          <p:style>
+            <a:lnRef idx="2">
+              <a:schemeClr val="accent1">
+                <a:shade val="50000"/>
+              </a:schemeClr>
+            </a:lnRef>
+            <a:fillRef idx="1">
+              <a:schemeClr val="accent1"/>
+            </a:fillRef>
+            <a:effectRef idx="0">
+              <a:schemeClr val="accent1"/>
+            </a:effectRef>
+            <a:fontRef idx="minor">
+              <a:schemeClr val="lt1"/>
+            </a:fontRef>
+          </p:style>
+          <p:txBody>
+            <a:bodyPr rtlCol="0" anchor="ctr"/>
+            <a:lstStyle/>
+            <a:p>
+              <a:pPr algn="ctr"/>
+              <a:endParaRPr lang="en-GB"/>
+            </a:p>
+          </p:txBody>
+        </p:sp>
+      </p:grpSp>
+    </p:spTree>
+    <p:extLst>
+      <p:ext uri="{BB962C8B-B14F-4D97-AF65-F5344CB8AC3E}">
+        <p14:creationId xmlns:p14="http://schemas.microsoft.com/office/powerpoint/2010/main" val="3846822599"/>
+      </p:ext>
+    </p:extLst>
+  </p:cSld>
+  <p:clrMapOvr>
+    <a:masterClrMapping/>
+  </p:clrMapOvr>
+  <p:timing>
+    <p:tnLst>
+      <p:par>
+        <p:cTn id="1" dur="indefinite" restart="never" nodeType="tmRoot"/>
+      </p:par>
+    </p:tnLst>
+  </p:timing>
+</p:sld>
+</file>
+
+<file path=ppt/slides/slide23.xml><?xml version="1.0" encoding="utf-8"?>
+<p:sld xmlns:a="http://schemas.openxmlformats.org/drawingml/2006/main" xmlns:r="http://schemas.openxmlformats.org/officeDocument/2006/relationships" xmlns:p="http://schemas.openxmlformats.org/presentationml/2006/main">
+  <p:cSld>
+    <p:spTree>
+      <p:nvGrpSpPr>
+        <p:cNvPr id="1" name=""/>
+        <p:cNvGrpSpPr/>
+        <p:nvPr/>
+      </p:nvGrpSpPr>
+      <p:grpSpPr>
+        <a:xfrm>
+          <a:off x="0" y="0"/>
+          <a:ext cx="0" cy="0"/>
+          <a:chOff x="0" y="0"/>
+          <a:chExt cx="0" cy="0"/>
+        </a:xfrm>
+      </p:grpSpPr>
       <p:sp>
         <p:nvSpPr>
           <p:cNvPr id="3" name="Rectangle 2"/>
@@ -9284,323 +9640,6 @@
     <p:extLst>
       <p:ext uri="{BB962C8B-B14F-4D97-AF65-F5344CB8AC3E}">
         <p14:creationId xmlns:p14="http://schemas.microsoft.com/office/powerpoint/2010/main" val="3754646617"/>
-      </p:ext>
-    </p:extLst>
-  </p:cSld>
-  <p:clrMapOvr>
-    <a:masterClrMapping/>
-  </p:clrMapOvr>
-  <p:timing>
-    <p:tnLst>
-      <p:par>
-        <p:cTn id="1" dur="indefinite" restart="never" nodeType="tmRoot"/>
-      </p:par>
-    </p:tnLst>
-  </p:timing>
-</p:sld>
-</file>
-
-<file path=ppt/slides/slide23.xml><?xml version="1.0" encoding="utf-8"?>
-<p:sld xmlns:a="http://schemas.openxmlformats.org/drawingml/2006/main" xmlns:r="http://schemas.openxmlformats.org/officeDocument/2006/relationships" xmlns:p="http://schemas.openxmlformats.org/presentationml/2006/main">
-  <p:cSld>
-    <p:spTree>
-      <p:nvGrpSpPr>
-        <p:cNvPr id="1" name=""/>
-        <p:cNvGrpSpPr/>
-        <p:nvPr/>
-      </p:nvGrpSpPr>
-      <p:grpSpPr>
-        <a:xfrm>
-          <a:off x="0" y="0"/>
-          <a:ext cx="0" cy="0"/>
-          <a:chOff x="0" y="0"/>
-          <a:chExt cx="0" cy="0"/>
-        </a:xfrm>
-      </p:grpSpPr>
-      <p:sp>
-        <p:nvSpPr>
-          <p:cNvPr id="5" name="Rectangle 4"/>
-          <p:cNvSpPr/>
-          <p:nvPr/>
-        </p:nvSpPr>
-        <p:spPr>
-          <a:xfrm>
-            <a:off x="2073000" y="549000"/>
-            <a:ext cx="5760000" cy="5760000"/>
-          </a:xfrm>
-          <a:prstGeom prst="rect">
-            <a:avLst/>
-          </a:prstGeom>
-          <a:solidFill>
-            <a:schemeClr val="bg1"/>
-          </a:solidFill>
-          <a:ln>
-            <a:solidFill>
-              <a:schemeClr val="tx2"/>
-            </a:solidFill>
-          </a:ln>
-          <a:effectLst>
-            <a:outerShdw blurRad="50800" dist="38100" dir="2700000" algn="tl" rotWithShape="0">
-              <a:prstClr val="black">
-                <a:alpha val="40000"/>
-              </a:prstClr>
-            </a:outerShdw>
-          </a:effectLst>
-        </p:spPr>
-        <p:style>
-          <a:lnRef idx="2">
-            <a:schemeClr val="accent1">
-              <a:shade val="50000"/>
-            </a:schemeClr>
-          </a:lnRef>
-          <a:fillRef idx="1">
-            <a:schemeClr val="accent1"/>
-          </a:fillRef>
-          <a:effectRef idx="0">
-            <a:schemeClr val="accent1"/>
-          </a:effectRef>
-          <a:fontRef idx="minor">
-            <a:schemeClr val="lt1"/>
-          </a:fontRef>
-        </p:style>
-        <p:txBody>
-          <a:bodyPr lIns="180000" tIns="180000" rIns="180000" bIns="180000" rtlCol="0" anchor="t"/>
-          <a:lstStyle/>
-          <a:p>
-            <a:r>
-              <a:rPr lang="en-GB" sz="2400" smtClean="0">
-                <a:solidFill>
-                  <a:srgbClr val="7030A0"/>
-                </a:solidFill>
-                <a:latin typeface="Century Gothic" panose="020B0502020202020204" pitchFamily="34" charset="0"/>
-              </a:rPr>
-              <a:t>Pipes</a:t>
-            </a:r>
-          </a:p>
-          <a:p>
-            <a:endParaRPr lang="en-GB" sz="1600" smtClean="0">
-              <a:solidFill>
-                <a:schemeClr val="tx1"/>
-              </a:solidFill>
-              <a:latin typeface="Gill Sans MT" panose="020B0502020104020203" pitchFamily="34" charset="0"/>
-            </a:endParaRPr>
-          </a:p>
-          <a:p>
-            <a:r>
-              <a:rPr lang="en-GB" sz="1600" smtClean="0">
-                <a:solidFill>
-                  <a:schemeClr val="tx1"/>
-                </a:solidFill>
-                <a:latin typeface="Gill Sans MT" panose="020B0502020104020203" pitchFamily="34" charset="0"/>
-              </a:rPr>
-              <a:t>Laziness is seen as a virtue among computer programmers. Rather than carry out this pattern over and over:</a:t>
-            </a:r>
-          </a:p>
-          <a:p>
-            <a:endParaRPr lang="en-GB" sz="1600">
-              <a:solidFill>
-                <a:schemeClr val="tx1"/>
-              </a:solidFill>
-              <a:latin typeface="Gill Sans MT" panose="020B0502020104020203" pitchFamily="34" charset="0"/>
-            </a:endParaRPr>
-          </a:p>
-          <a:p>
-            <a:endParaRPr lang="en-GB" sz="1600" smtClean="0">
-              <a:solidFill>
-                <a:schemeClr val="tx1"/>
-              </a:solidFill>
-              <a:latin typeface="Gill Sans MT" panose="020B0502020104020203" pitchFamily="34" charset="0"/>
-            </a:endParaRPr>
-          </a:p>
-          <a:p>
-            <a:endParaRPr lang="en-GB" sz="1600">
-              <a:solidFill>
-                <a:schemeClr val="tx1"/>
-              </a:solidFill>
-              <a:latin typeface="Gill Sans MT" panose="020B0502020104020203" pitchFamily="34" charset="0"/>
-            </a:endParaRPr>
-          </a:p>
-          <a:p>
-            <a:endParaRPr lang="en-GB" sz="1600" smtClean="0">
-              <a:solidFill>
-                <a:schemeClr val="tx1"/>
-              </a:solidFill>
-              <a:latin typeface="Gill Sans MT" panose="020B0502020104020203" pitchFamily="34" charset="0"/>
-            </a:endParaRPr>
-          </a:p>
-          <a:p>
-            <a:endParaRPr lang="en-GB" sz="1600">
-              <a:solidFill>
-                <a:schemeClr val="tx1"/>
-              </a:solidFill>
-              <a:latin typeface="Gill Sans MT" panose="020B0502020104020203" pitchFamily="34" charset="0"/>
-            </a:endParaRPr>
-          </a:p>
-          <a:p>
-            <a:endParaRPr lang="en-GB" sz="1600" smtClean="0">
-              <a:solidFill>
-                <a:schemeClr val="tx1"/>
-              </a:solidFill>
-              <a:latin typeface="Gill Sans MT" panose="020B0502020104020203" pitchFamily="34" charset="0"/>
-            </a:endParaRPr>
-          </a:p>
-          <a:p>
-            <a:endParaRPr lang="en-GB" sz="1600">
-              <a:solidFill>
-                <a:schemeClr val="tx1"/>
-              </a:solidFill>
-              <a:latin typeface="Gill Sans MT" panose="020B0502020104020203" pitchFamily="34" charset="0"/>
-            </a:endParaRPr>
-          </a:p>
-          <a:p>
-            <a:endParaRPr lang="en-GB" sz="1600" smtClean="0">
-              <a:solidFill>
-                <a:schemeClr val="tx1"/>
-              </a:solidFill>
-              <a:latin typeface="Gill Sans MT" panose="020B0502020104020203" pitchFamily="34" charset="0"/>
-            </a:endParaRPr>
-          </a:p>
-          <a:p>
-            <a:endParaRPr lang="en-GB" sz="1600">
-              <a:solidFill>
-                <a:schemeClr val="tx1"/>
-              </a:solidFill>
-              <a:latin typeface="Gill Sans MT" panose="020B0502020104020203" pitchFamily="34" charset="0"/>
-            </a:endParaRPr>
-          </a:p>
-          <a:p>
-            <a:endParaRPr lang="en-GB" sz="1600" smtClean="0">
-              <a:solidFill>
-                <a:schemeClr val="tx1"/>
-              </a:solidFill>
-              <a:latin typeface="Gill Sans MT" panose="020B0502020104020203" pitchFamily="34" charset="0"/>
-            </a:endParaRPr>
-          </a:p>
-          <a:p>
-            <a:r>
-              <a:rPr lang="en-GB" sz="1600" smtClean="0">
-                <a:solidFill>
-                  <a:schemeClr val="tx1"/>
-                </a:solidFill>
-                <a:latin typeface="Gill Sans MT" panose="020B0502020104020203" pitchFamily="34" charset="0"/>
-              </a:rPr>
-              <a:t>…you can short-circuit the stdout/stdin using a ‘pipe’. </a:t>
-            </a:r>
-          </a:p>
-        </p:txBody>
-      </p:sp>
-      <p:pic>
-        <p:nvPicPr>
-          <p:cNvPr id="8196" name="Picture 4"/>
-          <p:cNvPicPr>
-            <a:picLocks noChangeAspect="1" noChangeArrowheads="1"/>
-          </p:cNvPicPr>
-          <p:nvPr/>
-        </p:nvPicPr>
-        <p:blipFill>
-          <a:blip r:embed="rId2" cstate="print">
-            <a:extLst>
-              <a:ext uri="{28A0092B-C50C-407E-A947-70E740481C1C}">
-                <a14:useLocalDpi xmlns:a14="http://schemas.microsoft.com/office/drawing/2010/main" val="0"/>
-              </a:ext>
-            </a:extLst>
-          </a:blip>
-          <a:srcRect/>
-          <a:stretch>
-            <a:fillRect/>
-          </a:stretch>
-        </p:blipFill>
-        <p:spPr bwMode="auto">
-          <a:xfrm>
-            <a:off x="2319116" y="1905000"/>
-            <a:ext cx="5229224" cy="2315965"/>
-          </a:xfrm>
-          <a:prstGeom prst="rect">
-            <a:avLst/>
-          </a:prstGeom>
-          <a:noFill/>
-          <a:ln>
-            <a:noFill/>
-          </a:ln>
-          <a:extLst>
-            <a:ext uri="{909E8E84-426E-40DD-AFC4-6F175D3DCCD1}">
-              <a14:hiddenFill xmlns:a14="http://schemas.microsoft.com/office/drawing/2010/main">
-                <a:solidFill>
-                  <a:schemeClr val="accent1"/>
-                </a:solidFill>
-              </a14:hiddenFill>
-            </a:ext>
-            <a:ext uri="{91240B29-F687-4F45-9708-019B960494DF}">
-              <a14:hiddenLine xmlns:a14="http://schemas.microsoft.com/office/drawing/2010/main" w="9525">
-                <a:solidFill>
-                  <a:schemeClr val="tx1"/>
-                </a:solidFill>
-                <a:miter lim="800000"/>
-                <a:headEnd/>
-                <a:tailEnd/>
-              </a14:hiddenLine>
-            </a:ext>
-          </a:extLst>
-        </p:spPr>
-      </p:pic>
-      <p:pic>
-        <p:nvPicPr>
-          <p:cNvPr id="8197" name="Picture 5"/>
-          <p:cNvPicPr>
-            <a:picLocks noChangeAspect="1" noChangeArrowheads="1"/>
-          </p:cNvPicPr>
-          <p:nvPr/>
-        </p:nvPicPr>
-        <p:blipFill>
-          <a:blip r:embed="rId3" cstate="print">
-            <a:extLst>
-              <a:ext uri="{28A0092B-C50C-407E-A947-70E740481C1C}">
-                <a14:useLocalDpi xmlns:a14="http://schemas.microsoft.com/office/drawing/2010/main" val="0"/>
-              </a:ext>
-            </a:extLst>
-          </a:blip>
-          <a:srcRect/>
-          <a:stretch>
-            <a:fillRect/>
-          </a:stretch>
-        </p:blipFill>
-        <p:spPr bwMode="auto">
-          <a:xfrm>
-            <a:off x="2133600" y="4572000"/>
-            <a:ext cx="5600257" cy="1247602"/>
-          </a:xfrm>
-          <a:prstGeom prst="rect">
-            <a:avLst/>
-          </a:prstGeom>
-          <a:noFill/>
-          <a:ln>
-            <a:noFill/>
-          </a:ln>
-          <a:extLst>
-            <a:ext uri="{909E8E84-426E-40DD-AFC4-6F175D3DCCD1}">
-              <a14:hiddenFill xmlns:a14="http://schemas.microsoft.com/office/drawing/2010/main">
-                <a:solidFill>
-                  <a:schemeClr val="accent1"/>
-                </a:solidFill>
-              </a14:hiddenFill>
-            </a:ext>
-            <a:ext uri="{91240B29-F687-4F45-9708-019B960494DF}">
-              <a14:hiddenLine xmlns:a14="http://schemas.microsoft.com/office/drawing/2010/main" w="9525">
-                <a:solidFill>
-                  <a:schemeClr val="tx1"/>
-                </a:solidFill>
-                <a:miter lim="800000"/>
-                <a:headEnd/>
-                <a:tailEnd/>
-              </a14:hiddenLine>
-            </a:ext>
-          </a:extLst>
-        </p:spPr>
-      </p:pic>
-    </p:spTree>
-    <p:extLst>
-      <p:ext uri="{BB962C8B-B14F-4D97-AF65-F5344CB8AC3E}">
-        <p14:creationId xmlns:p14="http://schemas.microsoft.com/office/powerpoint/2010/main" val="1857119514"/>
       </p:ext>
     </p:extLst>
   </p:cSld>
@@ -9685,6 +9724,323 @@
           <a:lstStyle/>
           <a:p>
             <a:r>
+              <a:rPr lang="en-GB" sz="2400" smtClean="0">
+                <a:solidFill>
+                  <a:srgbClr val="7030A0"/>
+                </a:solidFill>
+                <a:latin typeface="Century Gothic" panose="020B0502020202020204" pitchFamily="34" charset="0"/>
+              </a:rPr>
+              <a:t>Pipes</a:t>
+            </a:r>
+          </a:p>
+          <a:p>
+            <a:endParaRPr lang="en-GB" sz="1600" smtClean="0">
+              <a:solidFill>
+                <a:schemeClr val="tx1"/>
+              </a:solidFill>
+              <a:latin typeface="Gill Sans MT" panose="020B0502020104020203" pitchFamily="34" charset="0"/>
+            </a:endParaRPr>
+          </a:p>
+          <a:p>
+            <a:r>
+              <a:rPr lang="en-GB" sz="1600" smtClean="0">
+                <a:solidFill>
+                  <a:schemeClr val="tx1"/>
+                </a:solidFill>
+                <a:latin typeface="Gill Sans MT" panose="020B0502020104020203" pitchFamily="34" charset="0"/>
+              </a:rPr>
+              <a:t>Laziness is seen as a virtue among computer programmers. Rather than carry out this pattern over and over:</a:t>
+            </a:r>
+          </a:p>
+          <a:p>
+            <a:endParaRPr lang="en-GB" sz="1600">
+              <a:solidFill>
+                <a:schemeClr val="tx1"/>
+              </a:solidFill>
+              <a:latin typeface="Gill Sans MT" panose="020B0502020104020203" pitchFamily="34" charset="0"/>
+            </a:endParaRPr>
+          </a:p>
+          <a:p>
+            <a:endParaRPr lang="en-GB" sz="1600" smtClean="0">
+              <a:solidFill>
+                <a:schemeClr val="tx1"/>
+              </a:solidFill>
+              <a:latin typeface="Gill Sans MT" panose="020B0502020104020203" pitchFamily="34" charset="0"/>
+            </a:endParaRPr>
+          </a:p>
+          <a:p>
+            <a:endParaRPr lang="en-GB" sz="1600">
+              <a:solidFill>
+                <a:schemeClr val="tx1"/>
+              </a:solidFill>
+              <a:latin typeface="Gill Sans MT" panose="020B0502020104020203" pitchFamily="34" charset="0"/>
+            </a:endParaRPr>
+          </a:p>
+          <a:p>
+            <a:endParaRPr lang="en-GB" sz="1600" smtClean="0">
+              <a:solidFill>
+                <a:schemeClr val="tx1"/>
+              </a:solidFill>
+              <a:latin typeface="Gill Sans MT" panose="020B0502020104020203" pitchFamily="34" charset="0"/>
+            </a:endParaRPr>
+          </a:p>
+          <a:p>
+            <a:endParaRPr lang="en-GB" sz="1600">
+              <a:solidFill>
+                <a:schemeClr val="tx1"/>
+              </a:solidFill>
+              <a:latin typeface="Gill Sans MT" panose="020B0502020104020203" pitchFamily="34" charset="0"/>
+            </a:endParaRPr>
+          </a:p>
+          <a:p>
+            <a:endParaRPr lang="en-GB" sz="1600" smtClean="0">
+              <a:solidFill>
+                <a:schemeClr val="tx1"/>
+              </a:solidFill>
+              <a:latin typeface="Gill Sans MT" panose="020B0502020104020203" pitchFamily="34" charset="0"/>
+            </a:endParaRPr>
+          </a:p>
+          <a:p>
+            <a:endParaRPr lang="en-GB" sz="1600">
+              <a:solidFill>
+                <a:schemeClr val="tx1"/>
+              </a:solidFill>
+              <a:latin typeface="Gill Sans MT" panose="020B0502020104020203" pitchFamily="34" charset="0"/>
+            </a:endParaRPr>
+          </a:p>
+          <a:p>
+            <a:endParaRPr lang="en-GB" sz="1600" smtClean="0">
+              <a:solidFill>
+                <a:schemeClr val="tx1"/>
+              </a:solidFill>
+              <a:latin typeface="Gill Sans MT" panose="020B0502020104020203" pitchFamily="34" charset="0"/>
+            </a:endParaRPr>
+          </a:p>
+          <a:p>
+            <a:endParaRPr lang="en-GB" sz="1600">
+              <a:solidFill>
+                <a:schemeClr val="tx1"/>
+              </a:solidFill>
+              <a:latin typeface="Gill Sans MT" panose="020B0502020104020203" pitchFamily="34" charset="0"/>
+            </a:endParaRPr>
+          </a:p>
+          <a:p>
+            <a:endParaRPr lang="en-GB" sz="1600" smtClean="0">
+              <a:solidFill>
+                <a:schemeClr val="tx1"/>
+              </a:solidFill>
+              <a:latin typeface="Gill Sans MT" panose="020B0502020104020203" pitchFamily="34" charset="0"/>
+            </a:endParaRPr>
+          </a:p>
+          <a:p>
+            <a:r>
+              <a:rPr lang="en-GB" sz="1600" smtClean="0">
+                <a:solidFill>
+                  <a:schemeClr val="tx1"/>
+                </a:solidFill>
+                <a:latin typeface="Gill Sans MT" panose="020B0502020104020203" pitchFamily="34" charset="0"/>
+              </a:rPr>
+              <a:t>…you can short-circuit the stdout/stdin using a ‘pipe’. </a:t>
+            </a:r>
+          </a:p>
+        </p:txBody>
+      </p:sp>
+      <p:pic>
+        <p:nvPicPr>
+          <p:cNvPr id="8196" name="Picture 4"/>
+          <p:cNvPicPr>
+            <a:picLocks noChangeAspect="1" noChangeArrowheads="1"/>
+          </p:cNvPicPr>
+          <p:nvPr/>
+        </p:nvPicPr>
+        <p:blipFill>
+          <a:blip r:embed="rId2" cstate="print">
+            <a:extLst>
+              <a:ext uri="{28A0092B-C50C-407E-A947-70E740481C1C}">
+                <a14:useLocalDpi xmlns:a14="http://schemas.microsoft.com/office/drawing/2010/main" val="0"/>
+              </a:ext>
+            </a:extLst>
+          </a:blip>
+          <a:srcRect/>
+          <a:stretch>
+            <a:fillRect/>
+          </a:stretch>
+        </p:blipFill>
+        <p:spPr bwMode="auto">
+          <a:xfrm>
+            <a:off x="2319116" y="1905000"/>
+            <a:ext cx="5229224" cy="2315965"/>
+          </a:xfrm>
+          <a:prstGeom prst="rect">
+            <a:avLst/>
+          </a:prstGeom>
+          <a:noFill/>
+          <a:ln>
+            <a:noFill/>
+          </a:ln>
+          <a:extLst>
+            <a:ext uri="{909E8E84-426E-40DD-AFC4-6F175D3DCCD1}">
+              <a14:hiddenFill xmlns:a14="http://schemas.microsoft.com/office/drawing/2010/main">
+                <a:solidFill>
+                  <a:schemeClr val="accent1"/>
+                </a:solidFill>
+              </a14:hiddenFill>
+            </a:ext>
+            <a:ext uri="{91240B29-F687-4F45-9708-019B960494DF}">
+              <a14:hiddenLine xmlns:a14="http://schemas.microsoft.com/office/drawing/2010/main" w="9525">
+                <a:solidFill>
+                  <a:schemeClr val="tx1"/>
+                </a:solidFill>
+                <a:miter lim="800000"/>
+                <a:headEnd/>
+                <a:tailEnd/>
+              </a14:hiddenLine>
+            </a:ext>
+          </a:extLst>
+        </p:spPr>
+      </p:pic>
+      <p:pic>
+        <p:nvPicPr>
+          <p:cNvPr id="8197" name="Picture 5"/>
+          <p:cNvPicPr>
+            <a:picLocks noChangeAspect="1" noChangeArrowheads="1"/>
+          </p:cNvPicPr>
+          <p:nvPr/>
+        </p:nvPicPr>
+        <p:blipFill>
+          <a:blip r:embed="rId3" cstate="print">
+            <a:extLst>
+              <a:ext uri="{28A0092B-C50C-407E-A947-70E740481C1C}">
+                <a14:useLocalDpi xmlns:a14="http://schemas.microsoft.com/office/drawing/2010/main" val="0"/>
+              </a:ext>
+            </a:extLst>
+          </a:blip>
+          <a:srcRect/>
+          <a:stretch>
+            <a:fillRect/>
+          </a:stretch>
+        </p:blipFill>
+        <p:spPr bwMode="auto">
+          <a:xfrm>
+            <a:off x="2133600" y="4572000"/>
+            <a:ext cx="5600257" cy="1247602"/>
+          </a:xfrm>
+          <a:prstGeom prst="rect">
+            <a:avLst/>
+          </a:prstGeom>
+          <a:noFill/>
+          <a:ln>
+            <a:noFill/>
+          </a:ln>
+          <a:extLst>
+            <a:ext uri="{909E8E84-426E-40DD-AFC4-6F175D3DCCD1}">
+              <a14:hiddenFill xmlns:a14="http://schemas.microsoft.com/office/drawing/2010/main">
+                <a:solidFill>
+                  <a:schemeClr val="accent1"/>
+                </a:solidFill>
+              </a14:hiddenFill>
+            </a:ext>
+            <a:ext uri="{91240B29-F687-4F45-9708-019B960494DF}">
+              <a14:hiddenLine xmlns:a14="http://schemas.microsoft.com/office/drawing/2010/main" w="9525">
+                <a:solidFill>
+                  <a:schemeClr val="tx1"/>
+                </a:solidFill>
+                <a:miter lim="800000"/>
+                <a:headEnd/>
+                <a:tailEnd/>
+              </a14:hiddenLine>
+            </a:ext>
+          </a:extLst>
+        </p:spPr>
+      </p:pic>
+    </p:spTree>
+    <p:extLst>
+      <p:ext uri="{BB962C8B-B14F-4D97-AF65-F5344CB8AC3E}">
+        <p14:creationId xmlns:p14="http://schemas.microsoft.com/office/powerpoint/2010/main" val="1857119514"/>
+      </p:ext>
+    </p:extLst>
+  </p:cSld>
+  <p:clrMapOvr>
+    <a:masterClrMapping/>
+  </p:clrMapOvr>
+  <p:timing>
+    <p:tnLst>
+      <p:par>
+        <p:cTn id="1" dur="indefinite" restart="never" nodeType="tmRoot"/>
+      </p:par>
+    </p:tnLst>
+  </p:timing>
+</p:sld>
+</file>
+
+<file path=ppt/slides/slide25.xml><?xml version="1.0" encoding="utf-8"?>
+<p:sld xmlns:a="http://schemas.openxmlformats.org/drawingml/2006/main" xmlns:r="http://schemas.openxmlformats.org/officeDocument/2006/relationships" xmlns:p="http://schemas.openxmlformats.org/presentationml/2006/main">
+  <p:cSld>
+    <p:spTree>
+      <p:nvGrpSpPr>
+        <p:cNvPr id="1" name=""/>
+        <p:cNvGrpSpPr/>
+        <p:nvPr/>
+      </p:nvGrpSpPr>
+      <p:grpSpPr>
+        <a:xfrm>
+          <a:off x="0" y="0"/>
+          <a:ext cx="0" cy="0"/>
+          <a:chOff x="0" y="0"/>
+          <a:chExt cx="0" cy="0"/>
+        </a:xfrm>
+      </p:grpSpPr>
+      <p:sp>
+        <p:nvSpPr>
+          <p:cNvPr id="5" name="Rectangle 4"/>
+          <p:cNvSpPr/>
+          <p:nvPr/>
+        </p:nvSpPr>
+        <p:spPr>
+          <a:xfrm>
+            <a:off x="2073000" y="549000"/>
+            <a:ext cx="5760000" cy="5760000"/>
+          </a:xfrm>
+          <a:prstGeom prst="rect">
+            <a:avLst/>
+          </a:prstGeom>
+          <a:solidFill>
+            <a:schemeClr val="bg1"/>
+          </a:solidFill>
+          <a:ln>
+            <a:solidFill>
+              <a:schemeClr val="tx2"/>
+            </a:solidFill>
+          </a:ln>
+          <a:effectLst>
+            <a:outerShdw blurRad="50800" dist="38100" dir="2700000" algn="tl" rotWithShape="0">
+              <a:prstClr val="black">
+                <a:alpha val="40000"/>
+              </a:prstClr>
+            </a:outerShdw>
+          </a:effectLst>
+        </p:spPr>
+        <p:style>
+          <a:lnRef idx="2">
+            <a:schemeClr val="accent1">
+              <a:shade val="50000"/>
+            </a:schemeClr>
+          </a:lnRef>
+          <a:fillRef idx="1">
+            <a:schemeClr val="accent1"/>
+          </a:fillRef>
+          <a:effectRef idx="0">
+            <a:schemeClr val="accent1"/>
+          </a:effectRef>
+          <a:fontRef idx="minor">
+            <a:schemeClr val="lt1"/>
+          </a:fontRef>
+        </p:style>
+        <p:txBody>
+          <a:bodyPr lIns="180000" tIns="180000" rIns="180000" bIns="180000" rtlCol="0" anchor="t"/>
+          <a:lstStyle/>
+          <a:p>
+            <a:r>
               <a:rPr lang="en-GB" sz="1600" smtClean="0">
                 <a:solidFill>
                   <a:schemeClr val="tx1"/>
@@ -10114,7 +10470,7 @@
 </p:sld>
 </file>
 
-<file path=ppt/slides/slide25.xml><?xml version="1.0" encoding="utf-8"?>
+<file path=ppt/slides/slide26.xml><?xml version="1.0" encoding="utf-8"?>
 <p:sld xmlns:a="http://schemas.openxmlformats.org/drawingml/2006/main" xmlns:r="http://schemas.openxmlformats.org/officeDocument/2006/relationships" xmlns:p="http://schemas.openxmlformats.org/presentationml/2006/main">
   <p:cSld>
     <p:spTree>
@@ -10317,554 +10673,6 @@
     <p:extLst>
       <p:ext uri="{BB962C8B-B14F-4D97-AF65-F5344CB8AC3E}">
         <p14:creationId xmlns:p14="http://schemas.microsoft.com/office/powerpoint/2010/main" val="581230194"/>
-      </p:ext>
-    </p:extLst>
-  </p:cSld>
-  <p:clrMapOvr>
-    <a:masterClrMapping/>
-  </p:clrMapOvr>
-  <p:timing>
-    <p:tnLst>
-      <p:par>
-        <p:cTn id="1" dur="indefinite" restart="never" nodeType="tmRoot"/>
-      </p:par>
-    </p:tnLst>
-  </p:timing>
-</p:sld>
-</file>
-
-<file path=ppt/slides/slide26.xml><?xml version="1.0" encoding="utf-8"?>
-<p:sld xmlns:a="http://schemas.openxmlformats.org/drawingml/2006/main" xmlns:r="http://schemas.openxmlformats.org/officeDocument/2006/relationships" xmlns:p="http://schemas.openxmlformats.org/presentationml/2006/main">
-  <p:cSld>
-    <p:spTree>
-      <p:nvGrpSpPr>
-        <p:cNvPr id="1" name=""/>
-        <p:cNvGrpSpPr/>
-        <p:nvPr/>
-      </p:nvGrpSpPr>
-      <p:grpSpPr>
-        <a:xfrm>
-          <a:off x="0" y="0"/>
-          <a:ext cx="0" cy="0"/>
-          <a:chOff x="0" y="0"/>
-          <a:chExt cx="0" cy="0"/>
-        </a:xfrm>
-      </p:grpSpPr>
-      <p:sp>
-        <p:nvSpPr>
-          <p:cNvPr id="4" name="Rectangle 3"/>
-          <p:cNvSpPr/>
-          <p:nvPr/>
-        </p:nvSpPr>
-        <p:spPr>
-          <a:xfrm>
-            <a:off x="457200" y="457200"/>
-            <a:ext cx="4320000" cy="1676400"/>
-          </a:xfrm>
-          <a:prstGeom prst="rect">
-            <a:avLst/>
-          </a:prstGeom>
-          <a:solidFill>
-            <a:schemeClr val="bg1"/>
-          </a:solidFill>
-          <a:ln>
-            <a:solidFill>
-              <a:schemeClr val="tx2"/>
-            </a:solidFill>
-          </a:ln>
-          <a:effectLst>
-            <a:outerShdw blurRad="50800" dist="38100" dir="2700000" algn="tl" rotWithShape="0">
-              <a:prstClr val="black">
-                <a:alpha val="40000"/>
-              </a:prstClr>
-            </a:outerShdw>
-          </a:effectLst>
-        </p:spPr>
-        <p:style>
-          <a:lnRef idx="2">
-            <a:schemeClr val="accent1">
-              <a:shade val="50000"/>
-            </a:schemeClr>
-          </a:lnRef>
-          <a:fillRef idx="1">
-            <a:schemeClr val="accent1"/>
-          </a:fillRef>
-          <a:effectRef idx="0">
-            <a:schemeClr val="accent1"/>
-          </a:effectRef>
-          <a:fontRef idx="minor">
-            <a:schemeClr val="lt1"/>
-          </a:fontRef>
-        </p:style>
-        <p:txBody>
-          <a:bodyPr lIns="180000" tIns="180000" rIns="180000" bIns="180000" rtlCol="0" anchor="t"/>
-          <a:lstStyle/>
-          <a:p>
-            <a:r>
-              <a:rPr lang="en-GB" sz="2400" b="1" smtClean="0">
-                <a:solidFill>
-                  <a:srgbClr val="7030A0"/>
-                </a:solidFill>
-                <a:latin typeface="Courier New" panose="02070309020205020404" pitchFamily="49" charset="0"/>
-                <a:cs typeface="Courier New" panose="02070309020205020404" pitchFamily="49" charset="0"/>
-              </a:rPr>
-              <a:t>wc</a:t>
-            </a:r>
-          </a:p>
-          <a:p>
-            <a:r>
-              <a:rPr lang="en-GB" sz="1600" smtClean="0">
-                <a:solidFill>
-                  <a:schemeClr val="tx1"/>
-                </a:solidFill>
-                <a:latin typeface="Gill Sans MT" panose="020B0502020104020203" pitchFamily="34" charset="0"/>
-              </a:rPr>
-              <a:t>‘word count’</a:t>
-            </a:r>
-          </a:p>
-          <a:p>
-            <a:endParaRPr lang="en-GB" sz="1600">
-              <a:solidFill>
-                <a:schemeClr val="tx1"/>
-              </a:solidFill>
-              <a:latin typeface="Gill Sans MT" panose="020B0502020104020203" pitchFamily="34" charset="0"/>
-            </a:endParaRPr>
-          </a:p>
-          <a:p>
-            <a:r>
-              <a:rPr lang="en-GB" sz="1600" smtClean="0">
-                <a:solidFill>
-                  <a:schemeClr val="tx1"/>
-                </a:solidFill>
-                <a:latin typeface="Gill Sans MT" panose="020B0502020104020203" pitchFamily="34" charset="0"/>
-              </a:rPr>
-              <a:t>Counts the number of characters, words and lines in a text file.</a:t>
-            </a:r>
-            <a:endParaRPr lang="en-GB" sz="1600" dirty="0">
-              <a:solidFill>
-                <a:schemeClr val="tx1"/>
-              </a:solidFill>
-              <a:latin typeface="Gill Sans MT" panose="020B0502020104020203" pitchFamily="34" charset="0"/>
-            </a:endParaRPr>
-          </a:p>
-        </p:txBody>
-      </p:sp>
-      <p:sp>
-        <p:nvSpPr>
-          <p:cNvPr id="5" name="Rectangle 4"/>
-          <p:cNvSpPr/>
-          <p:nvPr/>
-        </p:nvSpPr>
-        <p:spPr>
-          <a:xfrm>
-            <a:off x="462815" y="2514600"/>
-            <a:ext cx="4320000" cy="1676400"/>
-          </a:xfrm>
-          <a:prstGeom prst="rect">
-            <a:avLst/>
-          </a:prstGeom>
-          <a:solidFill>
-            <a:schemeClr val="bg1"/>
-          </a:solidFill>
-          <a:ln>
-            <a:solidFill>
-              <a:schemeClr val="tx2"/>
-            </a:solidFill>
-          </a:ln>
-          <a:effectLst>
-            <a:outerShdw blurRad="50800" dist="38100" dir="2700000" algn="tl" rotWithShape="0">
-              <a:prstClr val="black">
-                <a:alpha val="40000"/>
-              </a:prstClr>
-            </a:outerShdw>
-          </a:effectLst>
-        </p:spPr>
-        <p:style>
-          <a:lnRef idx="2">
-            <a:schemeClr val="accent1">
-              <a:shade val="50000"/>
-            </a:schemeClr>
-          </a:lnRef>
-          <a:fillRef idx="1">
-            <a:schemeClr val="accent1"/>
-          </a:fillRef>
-          <a:effectRef idx="0">
-            <a:schemeClr val="accent1"/>
-          </a:effectRef>
-          <a:fontRef idx="minor">
-            <a:schemeClr val="lt1"/>
-          </a:fontRef>
-        </p:style>
-        <p:txBody>
-          <a:bodyPr lIns="180000" tIns="180000" rIns="180000" bIns="180000" rtlCol="0" anchor="t"/>
-          <a:lstStyle/>
-          <a:p>
-            <a:r>
-              <a:rPr lang="en-GB" sz="2400" b="1" smtClean="0">
-                <a:solidFill>
-                  <a:srgbClr val="7030A0"/>
-                </a:solidFill>
-                <a:latin typeface="Courier New" panose="02070309020205020404" pitchFamily="49" charset="0"/>
-                <a:cs typeface="Courier New" panose="02070309020205020404" pitchFamily="49" charset="0"/>
-              </a:rPr>
-              <a:t>cat</a:t>
-            </a:r>
-            <a:endParaRPr lang="en-GB" sz="2400" b="1">
-              <a:solidFill>
-                <a:srgbClr val="7030A0"/>
-              </a:solidFill>
-              <a:latin typeface="Courier New" panose="02070309020205020404" pitchFamily="49" charset="0"/>
-              <a:cs typeface="Courier New" panose="02070309020205020404" pitchFamily="49" charset="0"/>
-            </a:endParaRPr>
-          </a:p>
-          <a:p>
-            <a:r>
-              <a:rPr lang="en-GB" sz="1600" smtClean="0">
-                <a:solidFill>
-                  <a:schemeClr val="tx1"/>
-                </a:solidFill>
-                <a:latin typeface="Gill Sans MT" panose="020B0502020104020203" pitchFamily="34" charset="0"/>
-              </a:rPr>
-              <a:t>‘concatenate’</a:t>
-            </a:r>
-          </a:p>
-          <a:p>
-            <a:endParaRPr lang="en-GB" sz="1600">
-              <a:solidFill>
-                <a:schemeClr val="tx1"/>
-              </a:solidFill>
-              <a:latin typeface="Gill Sans MT" panose="020B0502020104020203" pitchFamily="34" charset="0"/>
-            </a:endParaRPr>
-          </a:p>
-          <a:p>
-            <a:r>
-              <a:rPr lang="en-GB" sz="1600" smtClean="0">
-                <a:solidFill>
-                  <a:schemeClr val="tx1"/>
-                </a:solidFill>
-                <a:latin typeface="Gill Sans MT" panose="020B0502020104020203" pitchFamily="34" charset="0"/>
-              </a:rPr>
-              <a:t>Prints a single file or list of files to the screen.</a:t>
-            </a:r>
-            <a:endParaRPr lang="en-GB" sz="1600" dirty="0">
-              <a:solidFill>
-                <a:schemeClr val="tx1"/>
-              </a:solidFill>
-              <a:latin typeface="Gill Sans MT" panose="020B0502020104020203" pitchFamily="34" charset="0"/>
-            </a:endParaRPr>
-          </a:p>
-        </p:txBody>
-      </p:sp>
-      <p:sp>
-        <p:nvSpPr>
-          <p:cNvPr id="7" name="Rectangle 6"/>
-          <p:cNvSpPr/>
-          <p:nvPr/>
-        </p:nvSpPr>
-        <p:spPr>
-          <a:xfrm>
-            <a:off x="457200" y="4572000"/>
-            <a:ext cx="4320000" cy="1676400"/>
-          </a:xfrm>
-          <a:prstGeom prst="rect">
-            <a:avLst/>
-          </a:prstGeom>
-          <a:solidFill>
-            <a:schemeClr val="bg1"/>
-          </a:solidFill>
-          <a:ln>
-            <a:solidFill>
-              <a:schemeClr val="tx2"/>
-            </a:solidFill>
-          </a:ln>
-          <a:effectLst>
-            <a:outerShdw blurRad="50800" dist="38100" dir="2700000" algn="tl" rotWithShape="0">
-              <a:prstClr val="black">
-                <a:alpha val="40000"/>
-              </a:prstClr>
-            </a:outerShdw>
-          </a:effectLst>
-        </p:spPr>
-        <p:style>
-          <a:lnRef idx="2">
-            <a:schemeClr val="accent1">
-              <a:shade val="50000"/>
-            </a:schemeClr>
-          </a:lnRef>
-          <a:fillRef idx="1">
-            <a:schemeClr val="accent1"/>
-          </a:fillRef>
-          <a:effectRef idx="0">
-            <a:schemeClr val="accent1"/>
-          </a:effectRef>
-          <a:fontRef idx="minor">
-            <a:schemeClr val="lt1"/>
-          </a:fontRef>
-        </p:style>
-        <p:txBody>
-          <a:bodyPr lIns="180000" tIns="180000" rIns="180000" bIns="180000" rtlCol="0" anchor="t"/>
-          <a:lstStyle/>
-          <a:p>
-            <a:r>
-              <a:rPr lang="en-GB" sz="2400" b="1" smtClean="0">
-                <a:solidFill>
-                  <a:srgbClr val="7030A0"/>
-                </a:solidFill>
-                <a:latin typeface="Courier New" panose="02070309020205020404" pitchFamily="49" charset="0"/>
-                <a:cs typeface="Courier New" panose="02070309020205020404" pitchFamily="49" charset="0"/>
-              </a:rPr>
-              <a:t>sort, sort -n</a:t>
-            </a:r>
-            <a:endParaRPr lang="en-GB" sz="2400" b="1">
-              <a:solidFill>
-                <a:srgbClr val="7030A0"/>
-              </a:solidFill>
-              <a:latin typeface="Courier New" panose="02070309020205020404" pitchFamily="49" charset="0"/>
-              <a:cs typeface="Courier New" panose="02070309020205020404" pitchFamily="49" charset="0"/>
-            </a:endParaRPr>
-          </a:p>
-          <a:p>
-            <a:r>
-              <a:rPr lang="en-GB" sz="1600" smtClean="0">
-                <a:solidFill>
-                  <a:schemeClr val="tx1"/>
-                </a:solidFill>
-                <a:latin typeface="Gill Sans MT" panose="020B0502020104020203" pitchFamily="34" charset="0"/>
-              </a:rPr>
-              <a:t>Yes, ‘sort’</a:t>
-            </a:r>
-          </a:p>
-          <a:p>
-            <a:endParaRPr lang="en-GB" sz="1600">
-              <a:solidFill>
-                <a:schemeClr val="tx1"/>
-              </a:solidFill>
-              <a:latin typeface="Gill Sans MT" panose="020B0502020104020203" pitchFamily="34" charset="0"/>
-            </a:endParaRPr>
-          </a:p>
-          <a:p>
-            <a:r>
-              <a:rPr lang="en-GB" sz="1600" smtClean="0">
-                <a:solidFill>
-                  <a:schemeClr val="tx1"/>
-                </a:solidFill>
-                <a:latin typeface="Gill Sans MT" panose="020B0502020104020203" pitchFamily="34" charset="0"/>
-              </a:rPr>
-              <a:t>Sorts the lines of a text file alphabetically or by number.</a:t>
-            </a:r>
-            <a:endParaRPr lang="en-GB" sz="1600" dirty="0">
-              <a:solidFill>
-                <a:schemeClr val="tx1"/>
-              </a:solidFill>
-              <a:latin typeface="Gill Sans MT" panose="020B0502020104020203" pitchFamily="34" charset="0"/>
-            </a:endParaRPr>
-          </a:p>
-        </p:txBody>
-      </p:sp>
-      <p:sp>
-        <p:nvSpPr>
-          <p:cNvPr id="8" name="Rectangle 7"/>
-          <p:cNvSpPr/>
-          <p:nvPr/>
-        </p:nvSpPr>
-        <p:spPr>
-          <a:xfrm>
-            <a:off x="5105400" y="457200"/>
-            <a:ext cx="4320000" cy="1676400"/>
-          </a:xfrm>
-          <a:prstGeom prst="rect">
-            <a:avLst/>
-          </a:prstGeom>
-          <a:solidFill>
-            <a:schemeClr val="bg1"/>
-          </a:solidFill>
-          <a:ln>
-            <a:solidFill>
-              <a:schemeClr val="tx2"/>
-            </a:solidFill>
-          </a:ln>
-          <a:effectLst>
-            <a:outerShdw blurRad="50800" dist="38100" dir="2700000" algn="tl" rotWithShape="0">
-              <a:prstClr val="black">
-                <a:alpha val="40000"/>
-              </a:prstClr>
-            </a:outerShdw>
-          </a:effectLst>
-        </p:spPr>
-        <p:style>
-          <a:lnRef idx="2">
-            <a:schemeClr val="accent1">
-              <a:shade val="50000"/>
-            </a:schemeClr>
-          </a:lnRef>
-          <a:fillRef idx="1">
-            <a:schemeClr val="accent1"/>
-          </a:fillRef>
-          <a:effectRef idx="0">
-            <a:schemeClr val="accent1"/>
-          </a:effectRef>
-          <a:fontRef idx="minor">
-            <a:schemeClr val="lt1"/>
-          </a:fontRef>
-        </p:style>
-        <p:txBody>
-          <a:bodyPr lIns="180000" tIns="180000" rIns="180000" bIns="180000" rtlCol="0" anchor="t"/>
-          <a:lstStyle/>
-          <a:p>
-            <a:r>
-              <a:rPr lang="en-GB" sz="2400" b="1" smtClean="0">
-                <a:solidFill>
-                  <a:srgbClr val="7030A0"/>
-                </a:solidFill>
-                <a:latin typeface="Courier New" panose="02070309020205020404" pitchFamily="49" charset="0"/>
-                <a:cs typeface="Courier New" panose="02070309020205020404" pitchFamily="49" charset="0"/>
-              </a:rPr>
-              <a:t>head, head -N</a:t>
-            </a:r>
-            <a:endParaRPr lang="en-GB" sz="2400" b="1">
-              <a:solidFill>
-                <a:srgbClr val="7030A0"/>
-              </a:solidFill>
-              <a:latin typeface="Courier New" panose="02070309020205020404" pitchFamily="49" charset="0"/>
-              <a:cs typeface="Courier New" panose="02070309020205020404" pitchFamily="49" charset="0"/>
-            </a:endParaRPr>
-          </a:p>
-          <a:p>
-            <a:r>
-              <a:rPr lang="en-GB" sz="1600" smtClean="0">
-                <a:solidFill>
-                  <a:schemeClr val="tx1"/>
-                </a:solidFill>
-                <a:latin typeface="Gill Sans MT" panose="020B0502020104020203" pitchFamily="34" charset="0"/>
-              </a:rPr>
-              <a:t>‘head’</a:t>
-            </a:r>
-          </a:p>
-          <a:p>
-            <a:endParaRPr lang="en-GB" sz="1600">
-              <a:solidFill>
-                <a:schemeClr val="tx1"/>
-              </a:solidFill>
-              <a:latin typeface="Gill Sans MT" panose="020B0502020104020203" pitchFamily="34" charset="0"/>
-            </a:endParaRPr>
-          </a:p>
-          <a:p>
-            <a:r>
-              <a:rPr lang="en-GB" sz="1600" smtClean="0">
-                <a:solidFill>
-                  <a:schemeClr val="tx1"/>
-                </a:solidFill>
-                <a:latin typeface="Gill Sans MT" panose="020B0502020104020203" pitchFamily="34" charset="0"/>
-              </a:rPr>
-              <a:t>Prints the first few lines of a file, you can choose how many.</a:t>
-            </a:r>
-          </a:p>
-        </p:txBody>
-      </p:sp>
-      <p:sp>
-        <p:nvSpPr>
-          <p:cNvPr id="9" name="Rectangle 8"/>
-          <p:cNvSpPr/>
-          <p:nvPr/>
-        </p:nvSpPr>
-        <p:spPr>
-          <a:xfrm>
-            <a:off x="5105400" y="2514600"/>
-            <a:ext cx="4320000" cy="1676400"/>
-          </a:xfrm>
-          <a:prstGeom prst="rect">
-            <a:avLst/>
-          </a:prstGeom>
-          <a:solidFill>
-            <a:schemeClr val="bg1"/>
-          </a:solidFill>
-          <a:ln>
-            <a:solidFill>
-              <a:schemeClr val="tx2"/>
-            </a:solidFill>
-          </a:ln>
-          <a:effectLst>
-            <a:outerShdw blurRad="50800" dist="38100" dir="2700000" algn="tl" rotWithShape="0">
-              <a:prstClr val="black">
-                <a:alpha val="40000"/>
-              </a:prstClr>
-            </a:outerShdw>
-          </a:effectLst>
-        </p:spPr>
-        <p:style>
-          <a:lnRef idx="2">
-            <a:schemeClr val="accent1">
-              <a:shade val="50000"/>
-            </a:schemeClr>
-          </a:lnRef>
-          <a:fillRef idx="1">
-            <a:schemeClr val="accent1"/>
-          </a:fillRef>
-          <a:effectRef idx="0">
-            <a:schemeClr val="accent1"/>
-          </a:effectRef>
-          <a:fontRef idx="minor">
-            <a:schemeClr val="lt1"/>
-          </a:fontRef>
-        </p:style>
-        <p:txBody>
-          <a:bodyPr lIns="180000" tIns="180000" rIns="180000" bIns="180000" rtlCol="0" anchor="t"/>
-          <a:lstStyle/>
-          <a:p>
-            <a:r>
-              <a:rPr lang="en-GB" sz="2400" b="1" smtClean="0">
-                <a:solidFill>
-                  <a:srgbClr val="7030A0"/>
-                </a:solidFill>
-                <a:latin typeface="Courier New" panose="02070309020205020404" pitchFamily="49" charset="0"/>
-                <a:cs typeface="Courier New" panose="02070309020205020404" pitchFamily="49" charset="0"/>
-              </a:rPr>
-              <a:t>tail, tail -N</a:t>
-            </a:r>
-            <a:endParaRPr lang="en-GB" sz="2400" b="1">
-              <a:solidFill>
-                <a:srgbClr val="7030A0"/>
-              </a:solidFill>
-              <a:latin typeface="Courier New" panose="02070309020205020404" pitchFamily="49" charset="0"/>
-              <a:cs typeface="Courier New" panose="02070309020205020404" pitchFamily="49" charset="0"/>
-            </a:endParaRPr>
-          </a:p>
-          <a:p>
-            <a:r>
-              <a:rPr lang="en-GB" sz="1600" smtClean="0">
-                <a:solidFill>
-                  <a:schemeClr val="tx1"/>
-                </a:solidFill>
-                <a:latin typeface="Gill Sans MT" panose="020B0502020104020203" pitchFamily="34" charset="0"/>
-              </a:rPr>
-              <a:t>‘tail’</a:t>
-            </a:r>
-          </a:p>
-          <a:p>
-            <a:endParaRPr lang="en-GB" sz="1600">
-              <a:solidFill>
-                <a:schemeClr val="tx1"/>
-              </a:solidFill>
-              <a:latin typeface="Gill Sans MT" panose="020B0502020104020203" pitchFamily="34" charset="0"/>
-            </a:endParaRPr>
-          </a:p>
-          <a:p>
-            <a:r>
-              <a:rPr lang="en-GB" sz="1600" smtClean="0">
-                <a:solidFill>
-                  <a:schemeClr val="tx1"/>
-                </a:solidFill>
-                <a:latin typeface="Gill Sans MT" panose="020B0502020104020203" pitchFamily="34" charset="0"/>
-              </a:rPr>
-              <a:t>Prints the last few lines of a file.</a:t>
-            </a:r>
-          </a:p>
-        </p:txBody>
-      </p:sp>
-    </p:spTree>
-    <p:extLst>
-      <p:ext uri="{BB962C8B-B14F-4D97-AF65-F5344CB8AC3E}">
-        <p14:creationId xmlns:p14="http://schemas.microsoft.com/office/powerpoint/2010/main" val="1671870212"/>
       </p:ext>
     </p:extLst>
   </p:cSld>
@@ -10956,7 +10764,7 @@
                 <a:latin typeface="Courier New" panose="02070309020205020404" pitchFamily="49" charset="0"/>
                 <a:cs typeface="Courier New" panose="02070309020205020404" pitchFamily="49" charset="0"/>
               </a:rPr>
-              <a:t>grep</a:t>
+              <a:t>wc</a:t>
             </a:r>
           </a:p>
           <a:p>
@@ -10967,7 +10775,7 @@
                 </a:solidFill>
                 <a:latin typeface="Gill Sans MT" panose="020B0502020104020203" pitchFamily="34" charset="0"/>
               </a:rPr>
-              <a:t>‘global regular expression print’</a:t>
+              <a:t>‘word count’</a:t>
             </a:r>
           </a:p>
           <a:p>
@@ -10986,7 +10794,7 @@
                 </a:solidFill>
                 <a:latin typeface="Gill Sans MT" panose="020B0502020104020203" pitchFamily="34" charset="0"/>
               </a:rPr>
-              <a:t>Search for lines in a file containing a pattern.</a:t>
+              <a:t>Counts the number of characters, words and lines in a text file.</a:t>
             </a:r>
             <a:endParaRPr lang="en-GB" sz="1600" dirty="0">
               <a:solidFill>
@@ -11055,7 +10863,7 @@
                 <a:latin typeface="Courier New" panose="02070309020205020404" pitchFamily="49" charset="0"/>
                 <a:cs typeface="Courier New" panose="02070309020205020404" pitchFamily="49" charset="0"/>
               </a:rPr>
-              <a:t>man command</a:t>
+              <a:t>cat</a:t>
             </a:r>
             <a:endParaRPr lang="en-GB" sz="2400" b="1">
               <a:solidFill>
@@ -11073,7 +10881,7 @@
                 </a:solidFill>
                 <a:latin typeface="Gill Sans MT" panose="020B0502020104020203" pitchFamily="34" charset="0"/>
               </a:rPr>
-              <a:t>‘manual page’</a:t>
+              <a:t>‘concatenate’</a:t>
             </a:r>
           </a:p>
           <a:p>
@@ -11092,7 +10900,7 @@
                 </a:solidFill>
                 <a:latin typeface="Gill Sans MT" panose="020B0502020104020203" pitchFamily="34" charset="0"/>
               </a:rPr>
-              <a:t>Prints the manual page for a unix command. Very useful for flags and parameters. </a:t>
+              <a:t>Prints a single file or list of files to the screen.</a:t>
             </a:r>
             <a:endParaRPr lang="en-GB" sz="1600" dirty="0">
               <a:solidFill>
@@ -11161,7 +10969,7 @@
                 <a:latin typeface="Courier New" panose="02070309020205020404" pitchFamily="49" charset="0"/>
                 <a:cs typeface="Courier New" panose="02070309020205020404" pitchFamily="49" charset="0"/>
               </a:rPr>
-              <a:t>find, find –name</a:t>
+              <a:t>sort, sort -n</a:t>
             </a:r>
             <a:endParaRPr lang="en-GB" sz="2400" b="1">
               <a:solidFill>
@@ -11179,7 +10987,7 @@
                 </a:solidFill>
                 <a:latin typeface="Gill Sans MT" panose="020B0502020104020203" pitchFamily="34" charset="0"/>
               </a:rPr>
-              <a:t>‘find’</a:t>
+              <a:t>Yes, ‘sort’</a:t>
             </a:r>
           </a:p>
           <a:p>
@@ -11198,7 +11006,7 @@
                 </a:solidFill>
                 <a:latin typeface="Gill Sans MT" panose="020B0502020104020203" pitchFamily="34" charset="0"/>
               </a:rPr>
-              <a:t>Search for files whose name (or other properties) match the search parameters.</a:t>
+              <a:t>Sorts the lines of a text file alphabetically or by number.</a:t>
             </a:r>
             <a:endParaRPr lang="en-GB" sz="1600" dirty="0">
               <a:solidFill>
@@ -11206,6 +11014,206 @@
               </a:solidFill>
               <a:latin typeface="Gill Sans MT" panose="020B0502020104020203" pitchFamily="34" charset="0"/>
             </a:endParaRPr>
+          </a:p>
+        </p:txBody>
+      </p:sp>
+      <p:sp>
+        <p:nvSpPr>
+          <p:cNvPr id="8" name="Rectangle 7"/>
+          <p:cNvSpPr/>
+          <p:nvPr/>
+        </p:nvSpPr>
+        <p:spPr>
+          <a:xfrm>
+            <a:off x="5105400" y="457200"/>
+            <a:ext cx="4320000" cy="1676400"/>
+          </a:xfrm>
+          <a:prstGeom prst="rect">
+            <a:avLst/>
+          </a:prstGeom>
+          <a:solidFill>
+            <a:schemeClr val="bg1"/>
+          </a:solidFill>
+          <a:ln>
+            <a:solidFill>
+              <a:schemeClr val="tx2"/>
+            </a:solidFill>
+          </a:ln>
+          <a:effectLst>
+            <a:outerShdw blurRad="50800" dist="38100" dir="2700000" algn="tl" rotWithShape="0">
+              <a:prstClr val="black">
+                <a:alpha val="40000"/>
+              </a:prstClr>
+            </a:outerShdw>
+          </a:effectLst>
+        </p:spPr>
+        <p:style>
+          <a:lnRef idx="2">
+            <a:schemeClr val="accent1">
+              <a:shade val="50000"/>
+            </a:schemeClr>
+          </a:lnRef>
+          <a:fillRef idx="1">
+            <a:schemeClr val="accent1"/>
+          </a:fillRef>
+          <a:effectRef idx="0">
+            <a:schemeClr val="accent1"/>
+          </a:effectRef>
+          <a:fontRef idx="minor">
+            <a:schemeClr val="lt1"/>
+          </a:fontRef>
+        </p:style>
+        <p:txBody>
+          <a:bodyPr lIns="180000" tIns="180000" rIns="180000" bIns="180000" rtlCol="0" anchor="t"/>
+          <a:lstStyle/>
+          <a:p>
+            <a:r>
+              <a:rPr lang="en-GB" sz="2400" b="1" smtClean="0">
+                <a:solidFill>
+                  <a:srgbClr val="7030A0"/>
+                </a:solidFill>
+                <a:latin typeface="Courier New" panose="02070309020205020404" pitchFamily="49" charset="0"/>
+                <a:cs typeface="Courier New" panose="02070309020205020404" pitchFamily="49" charset="0"/>
+              </a:rPr>
+              <a:t>head, head -N</a:t>
+            </a:r>
+            <a:endParaRPr lang="en-GB" sz="2400" b="1">
+              <a:solidFill>
+                <a:srgbClr val="7030A0"/>
+              </a:solidFill>
+              <a:latin typeface="Courier New" panose="02070309020205020404" pitchFamily="49" charset="0"/>
+              <a:cs typeface="Courier New" panose="02070309020205020404" pitchFamily="49" charset="0"/>
+            </a:endParaRPr>
+          </a:p>
+          <a:p>
+            <a:r>
+              <a:rPr lang="en-GB" sz="1600" smtClean="0">
+                <a:solidFill>
+                  <a:schemeClr val="tx1"/>
+                </a:solidFill>
+                <a:latin typeface="Gill Sans MT" panose="020B0502020104020203" pitchFamily="34" charset="0"/>
+              </a:rPr>
+              <a:t>‘head’</a:t>
+            </a:r>
+          </a:p>
+          <a:p>
+            <a:endParaRPr lang="en-GB" sz="1600">
+              <a:solidFill>
+                <a:schemeClr val="tx1"/>
+              </a:solidFill>
+              <a:latin typeface="Gill Sans MT" panose="020B0502020104020203" pitchFamily="34" charset="0"/>
+            </a:endParaRPr>
+          </a:p>
+          <a:p>
+            <a:r>
+              <a:rPr lang="en-GB" sz="1600" smtClean="0">
+                <a:solidFill>
+                  <a:schemeClr val="tx1"/>
+                </a:solidFill>
+                <a:latin typeface="Gill Sans MT" panose="020B0502020104020203" pitchFamily="34" charset="0"/>
+              </a:rPr>
+              <a:t>Prints the first few lines of a file, you can choose how many.</a:t>
+            </a:r>
+          </a:p>
+        </p:txBody>
+      </p:sp>
+      <p:sp>
+        <p:nvSpPr>
+          <p:cNvPr id="9" name="Rectangle 8"/>
+          <p:cNvSpPr/>
+          <p:nvPr/>
+        </p:nvSpPr>
+        <p:spPr>
+          <a:xfrm>
+            <a:off x="5105400" y="2514600"/>
+            <a:ext cx="4320000" cy="1676400"/>
+          </a:xfrm>
+          <a:prstGeom prst="rect">
+            <a:avLst/>
+          </a:prstGeom>
+          <a:solidFill>
+            <a:schemeClr val="bg1"/>
+          </a:solidFill>
+          <a:ln>
+            <a:solidFill>
+              <a:schemeClr val="tx2"/>
+            </a:solidFill>
+          </a:ln>
+          <a:effectLst>
+            <a:outerShdw blurRad="50800" dist="38100" dir="2700000" algn="tl" rotWithShape="0">
+              <a:prstClr val="black">
+                <a:alpha val="40000"/>
+              </a:prstClr>
+            </a:outerShdw>
+          </a:effectLst>
+        </p:spPr>
+        <p:style>
+          <a:lnRef idx="2">
+            <a:schemeClr val="accent1">
+              <a:shade val="50000"/>
+            </a:schemeClr>
+          </a:lnRef>
+          <a:fillRef idx="1">
+            <a:schemeClr val="accent1"/>
+          </a:fillRef>
+          <a:effectRef idx="0">
+            <a:schemeClr val="accent1"/>
+          </a:effectRef>
+          <a:fontRef idx="minor">
+            <a:schemeClr val="lt1"/>
+          </a:fontRef>
+        </p:style>
+        <p:txBody>
+          <a:bodyPr lIns="180000" tIns="180000" rIns="180000" bIns="180000" rtlCol="0" anchor="t"/>
+          <a:lstStyle/>
+          <a:p>
+            <a:r>
+              <a:rPr lang="en-GB" sz="2400" b="1" smtClean="0">
+                <a:solidFill>
+                  <a:srgbClr val="7030A0"/>
+                </a:solidFill>
+                <a:latin typeface="Courier New" panose="02070309020205020404" pitchFamily="49" charset="0"/>
+                <a:cs typeface="Courier New" panose="02070309020205020404" pitchFamily="49" charset="0"/>
+              </a:rPr>
+              <a:t>tail, tail -N</a:t>
+            </a:r>
+            <a:endParaRPr lang="en-GB" sz="2400" b="1">
+              <a:solidFill>
+                <a:srgbClr val="7030A0"/>
+              </a:solidFill>
+              <a:latin typeface="Courier New" panose="02070309020205020404" pitchFamily="49" charset="0"/>
+              <a:cs typeface="Courier New" panose="02070309020205020404" pitchFamily="49" charset="0"/>
+            </a:endParaRPr>
+          </a:p>
+          <a:p>
+            <a:r>
+              <a:rPr lang="en-GB" sz="1600" smtClean="0">
+                <a:solidFill>
+                  <a:schemeClr val="tx1"/>
+                </a:solidFill>
+                <a:latin typeface="Gill Sans MT" panose="020B0502020104020203" pitchFamily="34" charset="0"/>
+              </a:rPr>
+              <a:t>‘tail’</a:t>
+            </a:r>
+          </a:p>
+          <a:p>
+            <a:endParaRPr lang="en-GB" sz="1600">
+              <a:solidFill>
+                <a:schemeClr val="tx1"/>
+              </a:solidFill>
+              <a:latin typeface="Gill Sans MT" panose="020B0502020104020203" pitchFamily="34" charset="0"/>
+            </a:endParaRPr>
+          </a:p>
+          <a:p>
+            <a:r>
+              <a:rPr lang="en-GB" sz="1600" smtClean="0">
+                <a:solidFill>
+                  <a:schemeClr val="tx1"/>
+                </a:solidFill>
+                <a:latin typeface="Gill Sans MT" panose="020B0502020104020203" pitchFamily="34" charset="0"/>
+              </a:rPr>
+              <a:t>Prints the last few lines of a file.</a:t>
+            </a:r>
           </a:p>
         </p:txBody>
       </p:sp>
@@ -11230,6 +11238,354 @@
 </file>
 
 <file path=ppt/slides/slide28.xml><?xml version="1.0" encoding="utf-8"?>
+<p:sld xmlns:a="http://schemas.openxmlformats.org/drawingml/2006/main" xmlns:r="http://schemas.openxmlformats.org/officeDocument/2006/relationships" xmlns:p="http://schemas.openxmlformats.org/presentationml/2006/main">
+  <p:cSld>
+    <p:spTree>
+      <p:nvGrpSpPr>
+        <p:cNvPr id="1" name=""/>
+        <p:cNvGrpSpPr/>
+        <p:nvPr/>
+      </p:nvGrpSpPr>
+      <p:grpSpPr>
+        <a:xfrm>
+          <a:off x="0" y="0"/>
+          <a:ext cx="0" cy="0"/>
+          <a:chOff x="0" y="0"/>
+          <a:chExt cx="0" cy="0"/>
+        </a:xfrm>
+      </p:grpSpPr>
+      <p:sp>
+        <p:nvSpPr>
+          <p:cNvPr id="4" name="Rectangle 3"/>
+          <p:cNvSpPr/>
+          <p:nvPr/>
+        </p:nvSpPr>
+        <p:spPr>
+          <a:xfrm>
+            <a:off x="457200" y="457200"/>
+            <a:ext cx="4320000" cy="1676400"/>
+          </a:xfrm>
+          <a:prstGeom prst="rect">
+            <a:avLst/>
+          </a:prstGeom>
+          <a:solidFill>
+            <a:schemeClr val="bg1"/>
+          </a:solidFill>
+          <a:ln>
+            <a:solidFill>
+              <a:schemeClr val="tx2"/>
+            </a:solidFill>
+          </a:ln>
+          <a:effectLst>
+            <a:outerShdw blurRad="50800" dist="38100" dir="2700000" algn="tl" rotWithShape="0">
+              <a:prstClr val="black">
+                <a:alpha val="40000"/>
+              </a:prstClr>
+            </a:outerShdw>
+          </a:effectLst>
+        </p:spPr>
+        <p:style>
+          <a:lnRef idx="2">
+            <a:schemeClr val="accent1">
+              <a:shade val="50000"/>
+            </a:schemeClr>
+          </a:lnRef>
+          <a:fillRef idx="1">
+            <a:schemeClr val="accent1"/>
+          </a:fillRef>
+          <a:effectRef idx="0">
+            <a:schemeClr val="accent1"/>
+          </a:effectRef>
+          <a:fontRef idx="minor">
+            <a:schemeClr val="lt1"/>
+          </a:fontRef>
+        </p:style>
+        <p:txBody>
+          <a:bodyPr lIns="180000" tIns="180000" rIns="180000" bIns="180000" rtlCol="0" anchor="t"/>
+          <a:lstStyle/>
+          <a:p>
+            <a:r>
+              <a:rPr lang="en-GB" sz="2400" b="1" smtClean="0">
+                <a:solidFill>
+                  <a:srgbClr val="7030A0"/>
+                </a:solidFill>
+                <a:latin typeface="Courier New" panose="02070309020205020404" pitchFamily="49" charset="0"/>
+                <a:cs typeface="Courier New" panose="02070309020205020404" pitchFamily="49" charset="0"/>
+              </a:rPr>
+              <a:t>grep</a:t>
+            </a:r>
+          </a:p>
+          <a:p>
+            <a:r>
+              <a:rPr lang="en-GB" sz="1600" smtClean="0">
+                <a:solidFill>
+                  <a:schemeClr val="tx1"/>
+                </a:solidFill>
+                <a:latin typeface="Gill Sans MT" panose="020B0502020104020203" pitchFamily="34" charset="0"/>
+              </a:rPr>
+              <a:t>‘global regular expression print’</a:t>
+            </a:r>
+          </a:p>
+          <a:p>
+            <a:endParaRPr lang="en-GB" sz="1600">
+              <a:solidFill>
+                <a:schemeClr val="tx1"/>
+              </a:solidFill>
+              <a:latin typeface="Gill Sans MT" panose="020B0502020104020203" pitchFamily="34" charset="0"/>
+            </a:endParaRPr>
+          </a:p>
+          <a:p>
+            <a:r>
+              <a:rPr lang="en-GB" sz="1600" smtClean="0">
+                <a:solidFill>
+                  <a:schemeClr val="tx1"/>
+                </a:solidFill>
+                <a:latin typeface="Gill Sans MT" panose="020B0502020104020203" pitchFamily="34" charset="0"/>
+              </a:rPr>
+              <a:t>Search for lines in a file containing a pattern.</a:t>
+            </a:r>
+            <a:endParaRPr lang="en-GB" sz="1600" dirty="0">
+              <a:solidFill>
+                <a:schemeClr val="tx1"/>
+              </a:solidFill>
+              <a:latin typeface="Gill Sans MT" panose="020B0502020104020203" pitchFamily="34" charset="0"/>
+            </a:endParaRPr>
+          </a:p>
+        </p:txBody>
+      </p:sp>
+      <p:sp>
+        <p:nvSpPr>
+          <p:cNvPr id="5" name="Rectangle 4"/>
+          <p:cNvSpPr/>
+          <p:nvPr/>
+        </p:nvSpPr>
+        <p:spPr>
+          <a:xfrm>
+            <a:off x="462815" y="2514600"/>
+            <a:ext cx="4320000" cy="1676400"/>
+          </a:xfrm>
+          <a:prstGeom prst="rect">
+            <a:avLst/>
+          </a:prstGeom>
+          <a:solidFill>
+            <a:schemeClr val="bg1"/>
+          </a:solidFill>
+          <a:ln>
+            <a:solidFill>
+              <a:schemeClr val="tx2"/>
+            </a:solidFill>
+          </a:ln>
+          <a:effectLst>
+            <a:outerShdw blurRad="50800" dist="38100" dir="2700000" algn="tl" rotWithShape="0">
+              <a:prstClr val="black">
+                <a:alpha val="40000"/>
+              </a:prstClr>
+            </a:outerShdw>
+          </a:effectLst>
+        </p:spPr>
+        <p:style>
+          <a:lnRef idx="2">
+            <a:schemeClr val="accent1">
+              <a:shade val="50000"/>
+            </a:schemeClr>
+          </a:lnRef>
+          <a:fillRef idx="1">
+            <a:schemeClr val="accent1"/>
+          </a:fillRef>
+          <a:effectRef idx="0">
+            <a:schemeClr val="accent1"/>
+          </a:effectRef>
+          <a:fontRef idx="minor">
+            <a:schemeClr val="lt1"/>
+          </a:fontRef>
+        </p:style>
+        <p:txBody>
+          <a:bodyPr lIns="180000" tIns="180000" rIns="180000" bIns="180000" rtlCol="0" anchor="t"/>
+          <a:lstStyle/>
+          <a:p>
+            <a:r>
+              <a:rPr lang="en-GB" sz="2400" b="1" smtClean="0">
+                <a:solidFill>
+                  <a:srgbClr val="7030A0"/>
+                </a:solidFill>
+                <a:latin typeface="Courier New" panose="02070309020205020404" pitchFamily="49" charset="0"/>
+                <a:cs typeface="Courier New" panose="02070309020205020404" pitchFamily="49" charset="0"/>
+              </a:rPr>
+              <a:t>man command</a:t>
+            </a:r>
+            <a:endParaRPr lang="en-GB" sz="2400" b="1">
+              <a:solidFill>
+                <a:srgbClr val="7030A0"/>
+              </a:solidFill>
+              <a:latin typeface="Courier New" panose="02070309020205020404" pitchFamily="49" charset="0"/>
+              <a:cs typeface="Courier New" panose="02070309020205020404" pitchFamily="49" charset="0"/>
+            </a:endParaRPr>
+          </a:p>
+          <a:p>
+            <a:r>
+              <a:rPr lang="en-GB" sz="1600" smtClean="0">
+                <a:solidFill>
+                  <a:schemeClr val="tx1"/>
+                </a:solidFill>
+                <a:latin typeface="Gill Sans MT" panose="020B0502020104020203" pitchFamily="34" charset="0"/>
+              </a:rPr>
+              <a:t>‘manual page’</a:t>
+            </a:r>
+          </a:p>
+          <a:p>
+            <a:endParaRPr lang="en-GB" sz="1600">
+              <a:solidFill>
+                <a:schemeClr val="tx1"/>
+              </a:solidFill>
+              <a:latin typeface="Gill Sans MT" panose="020B0502020104020203" pitchFamily="34" charset="0"/>
+            </a:endParaRPr>
+          </a:p>
+          <a:p>
+            <a:r>
+              <a:rPr lang="en-GB" sz="1600" smtClean="0">
+                <a:solidFill>
+                  <a:schemeClr val="tx1"/>
+                </a:solidFill>
+                <a:latin typeface="Gill Sans MT" panose="020B0502020104020203" pitchFamily="34" charset="0"/>
+              </a:rPr>
+              <a:t>Prints the manual page for a unix command. Very useful for flags and parameters. </a:t>
+            </a:r>
+            <a:endParaRPr lang="en-GB" sz="1600" dirty="0">
+              <a:solidFill>
+                <a:schemeClr val="tx1"/>
+              </a:solidFill>
+              <a:latin typeface="Gill Sans MT" panose="020B0502020104020203" pitchFamily="34" charset="0"/>
+            </a:endParaRPr>
+          </a:p>
+        </p:txBody>
+      </p:sp>
+      <p:sp>
+        <p:nvSpPr>
+          <p:cNvPr id="7" name="Rectangle 6"/>
+          <p:cNvSpPr/>
+          <p:nvPr/>
+        </p:nvSpPr>
+        <p:spPr>
+          <a:xfrm>
+            <a:off x="457200" y="4572000"/>
+            <a:ext cx="4320000" cy="1676400"/>
+          </a:xfrm>
+          <a:prstGeom prst="rect">
+            <a:avLst/>
+          </a:prstGeom>
+          <a:solidFill>
+            <a:schemeClr val="bg1"/>
+          </a:solidFill>
+          <a:ln>
+            <a:solidFill>
+              <a:schemeClr val="tx2"/>
+            </a:solidFill>
+          </a:ln>
+          <a:effectLst>
+            <a:outerShdw blurRad="50800" dist="38100" dir="2700000" algn="tl" rotWithShape="0">
+              <a:prstClr val="black">
+                <a:alpha val="40000"/>
+              </a:prstClr>
+            </a:outerShdw>
+          </a:effectLst>
+        </p:spPr>
+        <p:style>
+          <a:lnRef idx="2">
+            <a:schemeClr val="accent1">
+              <a:shade val="50000"/>
+            </a:schemeClr>
+          </a:lnRef>
+          <a:fillRef idx="1">
+            <a:schemeClr val="accent1"/>
+          </a:fillRef>
+          <a:effectRef idx="0">
+            <a:schemeClr val="accent1"/>
+          </a:effectRef>
+          <a:fontRef idx="minor">
+            <a:schemeClr val="lt1"/>
+          </a:fontRef>
+        </p:style>
+        <p:txBody>
+          <a:bodyPr lIns="180000" tIns="180000" rIns="180000" bIns="180000" rtlCol="0" anchor="t"/>
+          <a:lstStyle/>
+          <a:p>
+            <a:r>
+              <a:rPr lang="en-GB" sz="2400" b="1" smtClean="0">
+                <a:solidFill>
+                  <a:srgbClr val="7030A0"/>
+                </a:solidFill>
+                <a:latin typeface="Courier New" panose="02070309020205020404" pitchFamily="49" charset="0"/>
+                <a:cs typeface="Courier New" panose="02070309020205020404" pitchFamily="49" charset="0"/>
+              </a:rPr>
+              <a:t>find, find –name</a:t>
+            </a:r>
+            <a:endParaRPr lang="en-GB" sz="2400" b="1">
+              <a:solidFill>
+                <a:srgbClr val="7030A0"/>
+              </a:solidFill>
+              <a:latin typeface="Courier New" panose="02070309020205020404" pitchFamily="49" charset="0"/>
+              <a:cs typeface="Courier New" panose="02070309020205020404" pitchFamily="49" charset="0"/>
+            </a:endParaRPr>
+          </a:p>
+          <a:p>
+            <a:r>
+              <a:rPr lang="en-GB" sz="1600" smtClean="0">
+                <a:solidFill>
+                  <a:schemeClr val="tx1"/>
+                </a:solidFill>
+                <a:latin typeface="Gill Sans MT" panose="020B0502020104020203" pitchFamily="34" charset="0"/>
+              </a:rPr>
+              <a:t>‘find’</a:t>
+            </a:r>
+          </a:p>
+          <a:p>
+            <a:endParaRPr lang="en-GB" sz="1600">
+              <a:solidFill>
+                <a:schemeClr val="tx1"/>
+              </a:solidFill>
+              <a:latin typeface="Gill Sans MT" panose="020B0502020104020203" pitchFamily="34" charset="0"/>
+            </a:endParaRPr>
+          </a:p>
+          <a:p>
+            <a:r>
+              <a:rPr lang="en-GB" sz="1600" smtClean="0">
+                <a:solidFill>
+                  <a:schemeClr val="tx1"/>
+                </a:solidFill>
+                <a:latin typeface="Gill Sans MT" panose="020B0502020104020203" pitchFamily="34" charset="0"/>
+              </a:rPr>
+              <a:t>Search for files whose name (or other properties) match the search parameters.</a:t>
+            </a:r>
+            <a:endParaRPr lang="en-GB" sz="1600" dirty="0">
+              <a:solidFill>
+                <a:schemeClr val="tx1"/>
+              </a:solidFill>
+              <a:latin typeface="Gill Sans MT" panose="020B0502020104020203" pitchFamily="34" charset="0"/>
+            </a:endParaRPr>
+          </a:p>
+        </p:txBody>
+      </p:sp>
+    </p:spTree>
+    <p:extLst>
+      <p:ext uri="{BB962C8B-B14F-4D97-AF65-F5344CB8AC3E}">
+        <p14:creationId xmlns:p14="http://schemas.microsoft.com/office/powerpoint/2010/main" val="1671870212"/>
+      </p:ext>
+    </p:extLst>
+  </p:cSld>
+  <p:clrMapOvr>
+    <a:masterClrMapping/>
+  </p:clrMapOvr>
+  <p:timing>
+    <p:tnLst>
+      <p:par>
+        <p:cTn id="1" dur="indefinite" restart="never" nodeType="tmRoot"/>
+      </p:par>
+    </p:tnLst>
+  </p:timing>
+</p:sld>
+</file>
+
+<file path=ppt/slides/slide29.xml><?xml version="1.0" encoding="utf-8"?>
 <p:sld xmlns:a="http://schemas.openxmlformats.org/drawingml/2006/main" xmlns:r="http://schemas.openxmlformats.org/officeDocument/2006/relationships" xmlns:p="http://schemas.openxmlformats.org/presentationml/2006/main">
   <p:cSld>
     <p:spTree>
@@ -11640,7 +11996,465 @@
 </p:sld>
 </file>
 
-<file path=ppt/slides/slide29.xml><?xml version="1.0" encoding="utf-8"?>
+<file path=ppt/slides/slide3.xml><?xml version="1.0" encoding="utf-8"?>
+<p:sld xmlns:a="http://schemas.openxmlformats.org/drawingml/2006/main" xmlns:r="http://schemas.openxmlformats.org/officeDocument/2006/relationships" xmlns:p="http://schemas.openxmlformats.org/presentationml/2006/main">
+  <p:cSld>
+    <p:spTree>
+      <p:nvGrpSpPr>
+        <p:cNvPr id="1" name=""/>
+        <p:cNvGrpSpPr/>
+        <p:nvPr/>
+      </p:nvGrpSpPr>
+      <p:grpSpPr>
+        <a:xfrm>
+          <a:off x="0" y="0"/>
+          <a:ext cx="0" cy="0"/>
+          <a:chOff x="0" y="0"/>
+          <a:chExt cx="0" cy="0"/>
+        </a:xfrm>
+      </p:grpSpPr>
+      <p:sp>
+        <p:nvSpPr>
+          <p:cNvPr id="4" name="Rectangle 3"/>
+          <p:cNvSpPr/>
+          <p:nvPr/>
+        </p:nvSpPr>
+        <p:spPr>
+          <a:xfrm>
+            <a:off x="457200" y="457200"/>
+            <a:ext cx="4320000" cy="5760000"/>
+          </a:xfrm>
+          <a:prstGeom prst="rect">
+            <a:avLst/>
+          </a:prstGeom>
+          <a:solidFill>
+            <a:schemeClr val="bg1"/>
+          </a:solidFill>
+          <a:ln>
+            <a:solidFill>
+              <a:schemeClr val="tx2"/>
+            </a:solidFill>
+          </a:ln>
+          <a:effectLst>
+            <a:outerShdw blurRad="50800" dist="38100" dir="2700000" algn="tl" rotWithShape="0">
+              <a:prstClr val="black">
+                <a:alpha val="40000"/>
+              </a:prstClr>
+            </a:outerShdw>
+          </a:effectLst>
+        </p:spPr>
+        <p:style>
+          <a:lnRef idx="2">
+            <a:schemeClr val="accent1">
+              <a:shade val="50000"/>
+            </a:schemeClr>
+          </a:lnRef>
+          <a:fillRef idx="1">
+            <a:schemeClr val="accent1"/>
+          </a:fillRef>
+          <a:effectRef idx="0">
+            <a:schemeClr val="accent1"/>
+          </a:effectRef>
+          <a:fontRef idx="minor">
+            <a:schemeClr val="lt1"/>
+          </a:fontRef>
+        </p:style>
+        <p:txBody>
+          <a:bodyPr lIns="360000" tIns="360000" rIns="360000" bIns="360000" rtlCol="0" anchor="t"/>
+          <a:lstStyle/>
+          <a:p>
+            <a:r>
+              <a:rPr lang="en-GB" sz="2400" smtClean="0">
+                <a:solidFill>
+                  <a:srgbClr val="7030A0"/>
+                </a:solidFill>
+                <a:latin typeface="Century Gothic" panose="020B0502020202020204" pitchFamily="34" charset="0"/>
+              </a:rPr>
+              <a:t>Bad reasons to be here</a:t>
+            </a:r>
+          </a:p>
+          <a:p>
+            <a:endParaRPr lang="en-GB" sz="2400" smtClean="0">
+              <a:solidFill>
+                <a:srgbClr val="7030A0"/>
+              </a:solidFill>
+              <a:latin typeface="Century Gothic" panose="020B0502020202020204" pitchFamily="34" charset="0"/>
+            </a:endParaRPr>
+          </a:p>
+          <a:p>
+            <a:r>
+              <a:rPr lang="en-GB" sz="1600" strike="sngStrike" smtClean="0">
+                <a:solidFill>
+                  <a:schemeClr val="tx1"/>
+                </a:solidFill>
+                <a:latin typeface="Gill Sans MT" panose="020B0502020104020203" pitchFamily="34" charset="0"/>
+              </a:rPr>
+              <a:t>The shell is intutive and easy to use.</a:t>
+            </a:r>
+          </a:p>
+          <a:p>
+            <a:endParaRPr lang="en-GB" sz="1600">
+              <a:solidFill>
+                <a:schemeClr val="tx1"/>
+              </a:solidFill>
+              <a:latin typeface="Gill Sans MT" panose="020B0502020104020203" pitchFamily="34" charset="0"/>
+            </a:endParaRPr>
+          </a:p>
+          <a:p>
+            <a:pPr lvl="1"/>
+            <a:r>
+              <a:rPr lang="en-GB" sz="1600">
+                <a:solidFill>
+                  <a:schemeClr val="tx1"/>
+                </a:solidFill>
+                <a:latin typeface="Gill Sans MT" panose="020B0502020104020203" pitchFamily="34" charset="0"/>
+              </a:rPr>
+              <a:t>We’ll</a:t>
+            </a:r>
+            <a:r>
+              <a:rPr lang="en-GB" sz="1600" smtClean="0">
+                <a:solidFill>
+                  <a:schemeClr val="tx1"/>
+                </a:solidFill>
+                <a:latin typeface="Gill Sans MT" panose="020B0502020104020203" pitchFamily="34" charset="0"/>
+              </a:rPr>
+              <a:t> </a:t>
+            </a:r>
+            <a:r>
+              <a:rPr lang="en-GB" sz="1600">
+                <a:solidFill>
+                  <a:schemeClr val="tx1"/>
+                </a:solidFill>
+                <a:latin typeface="Gill Sans MT" panose="020B0502020104020203" pitchFamily="34" charset="0"/>
+              </a:rPr>
+              <a:t>let</a:t>
+            </a:r>
+            <a:r>
+              <a:rPr lang="en-GB" sz="1600" smtClean="0">
+                <a:solidFill>
+                  <a:schemeClr val="tx1"/>
+                </a:solidFill>
+                <a:latin typeface="Gill Sans MT" panose="020B0502020104020203" pitchFamily="34" charset="0"/>
+              </a:rPr>
+              <a:t> you judge…</a:t>
+            </a:r>
+          </a:p>
+          <a:p>
+            <a:endParaRPr lang="en-GB" sz="1600">
+              <a:solidFill>
+                <a:schemeClr val="tx1"/>
+              </a:solidFill>
+              <a:latin typeface="Gill Sans MT" panose="020B0502020104020203" pitchFamily="34" charset="0"/>
+            </a:endParaRPr>
+          </a:p>
+          <a:p>
+            <a:r>
+              <a:rPr lang="en-GB" sz="1600" strike="sngStrike">
+                <a:solidFill>
+                  <a:schemeClr val="tx1"/>
+                </a:solidFill>
+                <a:latin typeface="Gill Sans MT" panose="020B0502020104020203" pitchFamily="34" charset="0"/>
+              </a:rPr>
+              <a:t>Shell tools let us process </a:t>
+            </a:r>
+            <a:r>
+              <a:rPr lang="en-GB" sz="1600" strike="sngStrike" smtClean="0">
+                <a:solidFill>
+                  <a:schemeClr val="tx1"/>
+                </a:solidFill>
+                <a:latin typeface="Gill Sans MT" panose="020B0502020104020203" pitchFamily="34" charset="0"/>
+              </a:rPr>
+              <a:t>all kinds of data</a:t>
+            </a:r>
+            <a:r>
+              <a:rPr lang="en-GB" sz="1600" strike="sngStrike">
+                <a:solidFill>
+                  <a:schemeClr val="tx1"/>
+                </a:solidFill>
+                <a:latin typeface="Gill Sans MT" panose="020B0502020104020203" pitchFamily="34" charset="0"/>
+              </a:rPr>
+              <a:t>.</a:t>
+            </a:r>
+          </a:p>
+          <a:p>
+            <a:endParaRPr lang="en-GB" sz="1600">
+              <a:solidFill>
+                <a:schemeClr val="tx1"/>
+              </a:solidFill>
+              <a:latin typeface="Gill Sans MT" panose="020B0502020104020203" pitchFamily="34" charset="0"/>
+            </a:endParaRPr>
+          </a:p>
+          <a:p>
+            <a:pPr lvl="1"/>
+            <a:r>
+              <a:rPr lang="en-GB" sz="1600">
+                <a:solidFill>
+                  <a:schemeClr val="tx1"/>
+                </a:solidFill>
+                <a:latin typeface="Gill Sans MT" panose="020B0502020104020203" pitchFamily="34" charset="0"/>
+              </a:rPr>
+              <a:t>O</a:t>
+            </a:r>
+            <a:r>
+              <a:rPr lang="en-GB" sz="1600" smtClean="0">
+                <a:solidFill>
+                  <a:schemeClr val="tx1"/>
+                </a:solidFill>
+                <a:latin typeface="Gill Sans MT" panose="020B0502020104020203" pitchFamily="34" charset="0"/>
+              </a:rPr>
+              <a:t>nly if the data is suitably ‘retro’.</a:t>
+            </a:r>
+          </a:p>
+          <a:p>
+            <a:endParaRPr lang="en-GB" sz="1600">
+              <a:solidFill>
+                <a:schemeClr val="tx1"/>
+              </a:solidFill>
+              <a:latin typeface="Gill Sans MT" panose="020B0502020104020203" pitchFamily="34" charset="0"/>
+            </a:endParaRPr>
+          </a:p>
+          <a:p>
+            <a:r>
+              <a:rPr lang="en-GB" sz="1600" strike="sngStrike">
+                <a:solidFill>
+                  <a:schemeClr val="tx1"/>
+                </a:solidFill>
+                <a:latin typeface="Gill Sans MT" panose="020B0502020104020203" pitchFamily="34" charset="0"/>
+              </a:rPr>
+              <a:t>The shell is </a:t>
+            </a:r>
+            <a:r>
+              <a:rPr lang="en-GB" sz="1600" strike="sngStrike" smtClean="0">
+                <a:solidFill>
+                  <a:schemeClr val="tx1"/>
+                </a:solidFill>
+                <a:latin typeface="Gill Sans MT" panose="020B0502020104020203" pitchFamily="34" charset="0"/>
+              </a:rPr>
+              <a:t>a good programming </a:t>
+            </a:r>
+            <a:r>
+              <a:rPr lang="en-GB" sz="1600" strike="sngStrike">
+                <a:solidFill>
+                  <a:schemeClr val="tx1"/>
+                </a:solidFill>
+                <a:latin typeface="Gill Sans MT" panose="020B0502020104020203" pitchFamily="34" charset="0"/>
+              </a:rPr>
+              <a:t>language.</a:t>
+            </a:r>
+          </a:p>
+          <a:p>
+            <a:endParaRPr lang="en-GB" sz="1600">
+              <a:solidFill>
+                <a:schemeClr val="tx1"/>
+              </a:solidFill>
+              <a:latin typeface="Gill Sans MT" panose="020B0502020104020203" pitchFamily="34" charset="0"/>
+            </a:endParaRPr>
+          </a:p>
+          <a:p>
+            <a:pPr lvl="1"/>
+            <a:r>
+              <a:rPr lang="en-GB" sz="1600" smtClean="0">
+                <a:solidFill>
+                  <a:schemeClr val="tx1"/>
+                </a:solidFill>
+                <a:latin typeface="Gill Sans MT" panose="020B0502020104020203" pitchFamily="34" charset="0"/>
+              </a:rPr>
+              <a:t>The shell pre-dates 40 years of important advances in software engineering.</a:t>
+            </a:r>
+          </a:p>
+          <a:p>
+            <a:endParaRPr lang="en-GB" sz="1600">
+              <a:solidFill>
+                <a:schemeClr val="tx1"/>
+              </a:solidFill>
+              <a:latin typeface="Gill Sans MT" panose="020B0502020104020203" pitchFamily="34" charset="0"/>
+            </a:endParaRPr>
+          </a:p>
+          <a:p>
+            <a:endParaRPr lang="en-GB" sz="1600">
+              <a:solidFill>
+                <a:schemeClr val="tx1"/>
+              </a:solidFill>
+              <a:latin typeface="Gill Sans MT" panose="020B0502020104020203" pitchFamily="34" charset="0"/>
+            </a:endParaRPr>
+          </a:p>
+          <a:p>
+            <a:endParaRPr lang="en-GB" sz="1600" smtClean="0">
+              <a:solidFill>
+                <a:schemeClr val="tx1"/>
+              </a:solidFill>
+              <a:latin typeface="Gill Sans MT" panose="020B0502020104020203" pitchFamily="34" charset="0"/>
+            </a:endParaRPr>
+          </a:p>
+        </p:txBody>
+      </p:sp>
+      <p:sp>
+        <p:nvSpPr>
+          <p:cNvPr id="5" name="Rectangle 4"/>
+          <p:cNvSpPr/>
+          <p:nvPr/>
+        </p:nvSpPr>
+        <p:spPr>
+          <a:xfrm>
+            <a:off x="5181600" y="475648"/>
+            <a:ext cx="4320000" cy="5760000"/>
+          </a:xfrm>
+          <a:prstGeom prst="rect">
+            <a:avLst/>
+          </a:prstGeom>
+          <a:solidFill>
+            <a:schemeClr val="bg1"/>
+          </a:solidFill>
+          <a:ln>
+            <a:solidFill>
+              <a:schemeClr val="tx2"/>
+            </a:solidFill>
+          </a:ln>
+          <a:effectLst>
+            <a:outerShdw blurRad="50800" dist="38100" dir="2700000" algn="tl" rotWithShape="0">
+              <a:prstClr val="black">
+                <a:alpha val="40000"/>
+              </a:prstClr>
+            </a:outerShdw>
+          </a:effectLst>
+        </p:spPr>
+        <p:style>
+          <a:lnRef idx="2">
+            <a:schemeClr val="accent1">
+              <a:shade val="50000"/>
+            </a:schemeClr>
+          </a:lnRef>
+          <a:fillRef idx="1">
+            <a:schemeClr val="accent1"/>
+          </a:fillRef>
+          <a:effectRef idx="0">
+            <a:schemeClr val="accent1"/>
+          </a:effectRef>
+          <a:fontRef idx="minor">
+            <a:schemeClr val="lt1"/>
+          </a:fontRef>
+        </p:style>
+        <p:txBody>
+          <a:bodyPr lIns="360000" tIns="360000" rIns="360000" bIns="360000" rtlCol="0" anchor="t"/>
+          <a:lstStyle/>
+          <a:p>
+            <a:r>
+              <a:rPr lang="en-GB" sz="2400" smtClean="0">
+                <a:solidFill>
+                  <a:srgbClr val="7030A0"/>
+                </a:solidFill>
+                <a:latin typeface="Century Gothic" panose="020B0502020202020204" pitchFamily="34" charset="0"/>
+              </a:rPr>
+              <a:t>Good reasons to be here</a:t>
+            </a:r>
+          </a:p>
+          <a:p>
+            <a:endParaRPr lang="en-GB" sz="1600" smtClean="0">
+              <a:solidFill>
+                <a:schemeClr val="tx1"/>
+              </a:solidFill>
+              <a:latin typeface="Gill Sans MT" panose="020B0502020104020203" pitchFamily="34" charset="0"/>
+            </a:endParaRPr>
+          </a:p>
+          <a:p>
+            <a:r>
+              <a:rPr lang="en-GB" sz="1600" smtClean="0">
+                <a:solidFill>
+                  <a:schemeClr val="tx1"/>
+                </a:solidFill>
+                <a:latin typeface="Gill Sans MT" panose="020B0502020104020203" pitchFamily="34" charset="0"/>
+              </a:rPr>
+              <a:t>Unix-like operating systems are everywhere, and you can control them through the shell.</a:t>
+            </a:r>
+          </a:p>
+          <a:p>
+            <a:endParaRPr lang="en-GB" sz="1600">
+              <a:solidFill>
+                <a:schemeClr val="tx1"/>
+              </a:solidFill>
+              <a:latin typeface="Gill Sans MT" panose="020B0502020104020203" pitchFamily="34" charset="0"/>
+            </a:endParaRPr>
+          </a:p>
+          <a:p>
+            <a:r>
+              <a:rPr lang="en-GB" sz="1600" smtClean="0">
+                <a:solidFill>
+                  <a:schemeClr val="tx1"/>
+                </a:solidFill>
+                <a:latin typeface="Gill Sans MT" panose="020B0502020104020203" pitchFamily="34" charset="0"/>
+              </a:rPr>
+              <a:t>The shell allows you to automate workflows and eliminate repetetive tasks.</a:t>
+            </a:r>
+          </a:p>
+          <a:p>
+            <a:endParaRPr lang="en-GB" sz="1600" smtClean="0">
+              <a:solidFill>
+                <a:schemeClr val="tx1"/>
+              </a:solidFill>
+              <a:latin typeface="Gill Sans MT" panose="020B0502020104020203" pitchFamily="34" charset="0"/>
+            </a:endParaRPr>
+          </a:p>
+          <a:p>
+            <a:r>
+              <a:rPr lang="en-GB" sz="1600" smtClean="0">
+                <a:solidFill>
+                  <a:schemeClr val="tx1"/>
+                </a:solidFill>
+                <a:latin typeface="Gill Sans MT" panose="020B0502020104020203" pitchFamily="34" charset="0"/>
+              </a:rPr>
+              <a:t>The shell is the natural route to other power tools like C, perl, R, &amp; Java.</a:t>
+            </a:r>
+          </a:p>
+          <a:p>
+            <a:endParaRPr lang="en-GB" sz="1600">
+              <a:solidFill>
+                <a:schemeClr val="tx1"/>
+              </a:solidFill>
+              <a:latin typeface="Gill Sans MT" panose="020B0502020104020203" pitchFamily="34" charset="0"/>
+            </a:endParaRPr>
+          </a:p>
+          <a:p>
+            <a:r>
+              <a:rPr lang="en-GB" sz="1600">
+                <a:solidFill>
+                  <a:schemeClr val="tx1"/>
+                </a:solidFill>
+                <a:latin typeface="Gill Sans MT" panose="020B0502020104020203" pitchFamily="34" charset="0"/>
+              </a:rPr>
+              <a:t>The shell is your gateway to the world’s supercomputers.</a:t>
+            </a:r>
+          </a:p>
+          <a:p>
+            <a:endParaRPr lang="en-GB" sz="1600">
+              <a:solidFill>
+                <a:srgbClr val="7030A0"/>
+              </a:solidFill>
+              <a:latin typeface="Century Gothic" panose="020B0502020202020204" pitchFamily="34" charset="0"/>
+            </a:endParaRPr>
+          </a:p>
+        </p:txBody>
+      </p:sp>
+    </p:spTree>
+    <p:extLst>
+      <p:ext uri="{BB962C8B-B14F-4D97-AF65-F5344CB8AC3E}">
+        <p14:creationId xmlns:p14="http://schemas.microsoft.com/office/powerpoint/2010/main" val="4019835561"/>
+      </p:ext>
+    </p:extLst>
+  </p:cSld>
+  <p:clrMapOvr>
+    <a:masterClrMapping/>
+  </p:clrMapOvr>
+  <p:timing>
+    <p:tnLst>
+      <p:par>
+        <p:cTn id="1" dur="indefinite" restart="never" nodeType="tmRoot"/>
+      </p:par>
+    </p:tnLst>
+  </p:timing>
+</p:sld>
+</file>
+
+<file path=ppt/slides/slide30.xml><?xml version="1.0" encoding="utf-8"?>
 <p:sld xmlns:a="http://schemas.openxmlformats.org/drawingml/2006/main" xmlns:r="http://schemas.openxmlformats.org/officeDocument/2006/relationships" xmlns:p="http://schemas.openxmlformats.org/presentationml/2006/main">
   <p:cSld>
     <p:spTree>
@@ -11975,648 +12789,6 @@
 </p:sld>
 </file>
 
-<file path=ppt/slides/slide3.xml><?xml version="1.0" encoding="utf-8"?>
-<p:sld xmlns:a="http://schemas.openxmlformats.org/drawingml/2006/main" xmlns:r="http://schemas.openxmlformats.org/officeDocument/2006/relationships" xmlns:p="http://schemas.openxmlformats.org/presentationml/2006/main">
-  <p:cSld>
-    <p:spTree>
-      <p:nvGrpSpPr>
-        <p:cNvPr id="1" name=""/>
-        <p:cNvGrpSpPr/>
-        <p:nvPr/>
-      </p:nvGrpSpPr>
-      <p:grpSpPr>
-        <a:xfrm>
-          <a:off x="0" y="0"/>
-          <a:ext cx="0" cy="0"/>
-          <a:chOff x="0" y="0"/>
-          <a:chExt cx="0" cy="0"/>
-        </a:xfrm>
-      </p:grpSpPr>
-      <p:sp>
-        <p:nvSpPr>
-          <p:cNvPr id="4" name="Rectangle 3"/>
-          <p:cNvSpPr/>
-          <p:nvPr/>
-        </p:nvSpPr>
-        <p:spPr>
-          <a:xfrm>
-            <a:off x="457200" y="457200"/>
-            <a:ext cx="4320000" cy="5760000"/>
-          </a:xfrm>
-          <a:prstGeom prst="rect">
-            <a:avLst/>
-          </a:prstGeom>
-          <a:solidFill>
-            <a:schemeClr val="bg1"/>
-          </a:solidFill>
-          <a:ln>
-            <a:solidFill>
-              <a:schemeClr val="tx2"/>
-            </a:solidFill>
-          </a:ln>
-          <a:effectLst>
-            <a:outerShdw blurRad="50800" dist="38100" dir="2700000" algn="tl" rotWithShape="0">
-              <a:prstClr val="black">
-                <a:alpha val="40000"/>
-              </a:prstClr>
-            </a:outerShdw>
-          </a:effectLst>
-        </p:spPr>
-        <p:style>
-          <a:lnRef idx="2">
-            <a:schemeClr val="accent1">
-              <a:shade val="50000"/>
-            </a:schemeClr>
-          </a:lnRef>
-          <a:fillRef idx="1">
-            <a:schemeClr val="accent1"/>
-          </a:fillRef>
-          <a:effectRef idx="0">
-            <a:schemeClr val="accent1"/>
-          </a:effectRef>
-          <a:fontRef idx="minor">
-            <a:schemeClr val="lt1"/>
-          </a:fontRef>
-        </p:style>
-        <p:txBody>
-          <a:bodyPr lIns="360000" tIns="360000" rIns="360000" bIns="360000" rtlCol="0" anchor="t"/>
-          <a:lstStyle/>
-          <a:p>
-            <a:r>
-              <a:rPr lang="en-GB" sz="2400" smtClean="0">
-                <a:solidFill>
-                  <a:srgbClr val="7030A0"/>
-                </a:solidFill>
-                <a:latin typeface="Century Gothic" panose="020B0502020202020204" pitchFamily="34" charset="0"/>
-              </a:rPr>
-              <a:t>Bad reasons to be here</a:t>
-            </a:r>
-          </a:p>
-          <a:p>
-            <a:endParaRPr lang="en-GB" sz="2400" smtClean="0">
-              <a:solidFill>
-                <a:srgbClr val="7030A0"/>
-              </a:solidFill>
-              <a:latin typeface="Century Gothic" panose="020B0502020202020204" pitchFamily="34" charset="0"/>
-            </a:endParaRPr>
-          </a:p>
-          <a:p>
-            <a:r>
-              <a:rPr lang="en-GB" sz="1600" strike="sngStrike" smtClean="0">
-                <a:solidFill>
-                  <a:schemeClr val="tx1"/>
-                </a:solidFill>
-                <a:latin typeface="Gill Sans MT" panose="020B0502020104020203" pitchFamily="34" charset="0"/>
-              </a:rPr>
-              <a:t>The shell is intutive and easy to use.</a:t>
-            </a:r>
-          </a:p>
-          <a:p>
-            <a:endParaRPr lang="en-GB" sz="1600">
-              <a:solidFill>
-                <a:schemeClr val="tx1"/>
-              </a:solidFill>
-              <a:latin typeface="Gill Sans MT" panose="020B0502020104020203" pitchFamily="34" charset="0"/>
-            </a:endParaRPr>
-          </a:p>
-          <a:p>
-            <a:pPr lvl="1"/>
-            <a:r>
-              <a:rPr lang="en-GB" sz="1600">
-                <a:solidFill>
-                  <a:schemeClr val="tx1"/>
-                </a:solidFill>
-                <a:latin typeface="Gill Sans MT" panose="020B0502020104020203" pitchFamily="34" charset="0"/>
-              </a:rPr>
-              <a:t>We’ll</a:t>
-            </a:r>
-            <a:r>
-              <a:rPr lang="en-GB" sz="1600" smtClean="0">
-                <a:solidFill>
-                  <a:schemeClr val="tx1"/>
-                </a:solidFill>
-                <a:latin typeface="Gill Sans MT" panose="020B0502020104020203" pitchFamily="34" charset="0"/>
-              </a:rPr>
-              <a:t> </a:t>
-            </a:r>
-            <a:r>
-              <a:rPr lang="en-GB" sz="1600">
-                <a:solidFill>
-                  <a:schemeClr val="tx1"/>
-                </a:solidFill>
-                <a:latin typeface="Gill Sans MT" panose="020B0502020104020203" pitchFamily="34" charset="0"/>
-              </a:rPr>
-              <a:t>let</a:t>
-            </a:r>
-            <a:r>
-              <a:rPr lang="en-GB" sz="1600" smtClean="0">
-                <a:solidFill>
-                  <a:schemeClr val="tx1"/>
-                </a:solidFill>
-                <a:latin typeface="Gill Sans MT" panose="020B0502020104020203" pitchFamily="34" charset="0"/>
-              </a:rPr>
-              <a:t> you judge…</a:t>
-            </a:r>
-          </a:p>
-          <a:p>
-            <a:endParaRPr lang="en-GB" sz="1600">
-              <a:solidFill>
-                <a:schemeClr val="tx1"/>
-              </a:solidFill>
-              <a:latin typeface="Gill Sans MT" panose="020B0502020104020203" pitchFamily="34" charset="0"/>
-            </a:endParaRPr>
-          </a:p>
-          <a:p>
-            <a:r>
-              <a:rPr lang="en-GB" sz="1600" strike="sngStrike">
-                <a:solidFill>
-                  <a:schemeClr val="tx1"/>
-                </a:solidFill>
-                <a:latin typeface="Gill Sans MT" panose="020B0502020104020203" pitchFamily="34" charset="0"/>
-              </a:rPr>
-              <a:t>Shell tools let us process </a:t>
-            </a:r>
-            <a:r>
-              <a:rPr lang="en-GB" sz="1600" strike="sngStrike" smtClean="0">
-                <a:solidFill>
-                  <a:schemeClr val="tx1"/>
-                </a:solidFill>
-                <a:latin typeface="Gill Sans MT" panose="020B0502020104020203" pitchFamily="34" charset="0"/>
-              </a:rPr>
-              <a:t>all kinds of data</a:t>
-            </a:r>
-            <a:r>
-              <a:rPr lang="en-GB" sz="1600" strike="sngStrike">
-                <a:solidFill>
-                  <a:schemeClr val="tx1"/>
-                </a:solidFill>
-                <a:latin typeface="Gill Sans MT" panose="020B0502020104020203" pitchFamily="34" charset="0"/>
-              </a:rPr>
-              <a:t>.</a:t>
-            </a:r>
-          </a:p>
-          <a:p>
-            <a:endParaRPr lang="en-GB" sz="1600">
-              <a:solidFill>
-                <a:schemeClr val="tx1"/>
-              </a:solidFill>
-              <a:latin typeface="Gill Sans MT" panose="020B0502020104020203" pitchFamily="34" charset="0"/>
-            </a:endParaRPr>
-          </a:p>
-          <a:p>
-            <a:pPr lvl="1"/>
-            <a:r>
-              <a:rPr lang="en-GB" sz="1600">
-                <a:solidFill>
-                  <a:schemeClr val="tx1"/>
-                </a:solidFill>
-                <a:latin typeface="Gill Sans MT" panose="020B0502020104020203" pitchFamily="34" charset="0"/>
-              </a:rPr>
-              <a:t>O</a:t>
-            </a:r>
-            <a:r>
-              <a:rPr lang="en-GB" sz="1600" smtClean="0">
-                <a:solidFill>
-                  <a:schemeClr val="tx1"/>
-                </a:solidFill>
-                <a:latin typeface="Gill Sans MT" panose="020B0502020104020203" pitchFamily="34" charset="0"/>
-              </a:rPr>
-              <a:t>nly if the data is suitably ‘retro’.</a:t>
-            </a:r>
-          </a:p>
-          <a:p>
-            <a:endParaRPr lang="en-GB" sz="1600">
-              <a:solidFill>
-                <a:schemeClr val="tx1"/>
-              </a:solidFill>
-              <a:latin typeface="Gill Sans MT" panose="020B0502020104020203" pitchFamily="34" charset="0"/>
-            </a:endParaRPr>
-          </a:p>
-          <a:p>
-            <a:r>
-              <a:rPr lang="en-GB" sz="1600" strike="sngStrike">
-                <a:solidFill>
-                  <a:schemeClr val="tx1"/>
-                </a:solidFill>
-                <a:latin typeface="Gill Sans MT" panose="020B0502020104020203" pitchFamily="34" charset="0"/>
-              </a:rPr>
-              <a:t>The shell is </a:t>
-            </a:r>
-            <a:r>
-              <a:rPr lang="en-GB" sz="1600" strike="sngStrike" smtClean="0">
-                <a:solidFill>
-                  <a:schemeClr val="tx1"/>
-                </a:solidFill>
-                <a:latin typeface="Gill Sans MT" panose="020B0502020104020203" pitchFamily="34" charset="0"/>
-              </a:rPr>
-              <a:t>a good programming </a:t>
-            </a:r>
-            <a:r>
-              <a:rPr lang="en-GB" sz="1600" strike="sngStrike">
-                <a:solidFill>
-                  <a:schemeClr val="tx1"/>
-                </a:solidFill>
-                <a:latin typeface="Gill Sans MT" panose="020B0502020104020203" pitchFamily="34" charset="0"/>
-              </a:rPr>
-              <a:t>language.</a:t>
-            </a:r>
-          </a:p>
-          <a:p>
-            <a:endParaRPr lang="en-GB" sz="1600">
-              <a:solidFill>
-                <a:schemeClr val="tx1"/>
-              </a:solidFill>
-              <a:latin typeface="Gill Sans MT" panose="020B0502020104020203" pitchFamily="34" charset="0"/>
-            </a:endParaRPr>
-          </a:p>
-          <a:p>
-            <a:pPr lvl="1"/>
-            <a:r>
-              <a:rPr lang="en-GB" sz="1600" smtClean="0">
-                <a:solidFill>
-                  <a:schemeClr val="tx1"/>
-                </a:solidFill>
-                <a:latin typeface="Gill Sans MT" panose="020B0502020104020203" pitchFamily="34" charset="0"/>
-              </a:rPr>
-              <a:t>The shell pre-dates 40 years of important advances in software engineering.</a:t>
-            </a:r>
-          </a:p>
-          <a:p>
-            <a:endParaRPr lang="en-GB" sz="1600">
-              <a:solidFill>
-                <a:schemeClr val="tx1"/>
-              </a:solidFill>
-              <a:latin typeface="Gill Sans MT" panose="020B0502020104020203" pitchFamily="34" charset="0"/>
-            </a:endParaRPr>
-          </a:p>
-          <a:p>
-            <a:endParaRPr lang="en-GB" sz="1600">
-              <a:solidFill>
-                <a:schemeClr val="tx1"/>
-              </a:solidFill>
-              <a:latin typeface="Gill Sans MT" panose="020B0502020104020203" pitchFamily="34" charset="0"/>
-            </a:endParaRPr>
-          </a:p>
-          <a:p>
-            <a:endParaRPr lang="en-GB" sz="1600" smtClean="0">
-              <a:solidFill>
-                <a:schemeClr val="tx1"/>
-              </a:solidFill>
-              <a:latin typeface="Gill Sans MT" panose="020B0502020104020203" pitchFamily="34" charset="0"/>
-            </a:endParaRPr>
-          </a:p>
-        </p:txBody>
-      </p:sp>
-      <p:sp>
-        <p:nvSpPr>
-          <p:cNvPr id="5" name="Rectangle 4"/>
-          <p:cNvSpPr/>
-          <p:nvPr/>
-        </p:nvSpPr>
-        <p:spPr>
-          <a:xfrm>
-            <a:off x="5181600" y="475648"/>
-            <a:ext cx="4320000" cy="5760000"/>
-          </a:xfrm>
-          <a:prstGeom prst="rect">
-            <a:avLst/>
-          </a:prstGeom>
-          <a:solidFill>
-            <a:schemeClr val="bg1"/>
-          </a:solidFill>
-          <a:ln>
-            <a:solidFill>
-              <a:schemeClr val="tx2"/>
-            </a:solidFill>
-          </a:ln>
-          <a:effectLst>
-            <a:outerShdw blurRad="50800" dist="38100" dir="2700000" algn="tl" rotWithShape="0">
-              <a:prstClr val="black">
-                <a:alpha val="40000"/>
-              </a:prstClr>
-            </a:outerShdw>
-          </a:effectLst>
-        </p:spPr>
-        <p:style>
-          <a:lnRef idx="2">
-            <a:schemeClr val="accent1">
-              <a:shade val="50000"/>
-            </a:schemeClr>
-          </a:lnRef>
-          <a:fillRef idx="1">
-            <a:schemeClr val="accent1"/>
-          </a:fillRef>
-          <a:effectRef idx="0">
-            <a:schemeClr val="accent1"/>
-          </a:effectRef>
-          <a:fontRef idx="minor">
-            <a:schemeClr val="lt1"/>
-          </a:fontRef>
-        </p:style>
-        <p:txBody>
-          <a:bodyPr lIns="360000" tIns="360000" rIns="360000" bIns="360000" rtlCol="0" anchor="t"/>
-          <a:lstStyle/>
-          <a:p>
-            <a:r>
-              <a:rPr lang="en-GB" sz="2400" smtClean="0">
-                <a:solidFill>
-                  <a:srgbClr val="7030A0"/>
-                </a:solidFill>
-                <a:latin typeface="Century Gothic" panose="020B0502020202020204" pitchFamily="34" charset="0"/>
-              </a:rPr>
-              <a:t>Good reasons to be here</a:t>
-            </a:r>
-          </a:p>
-          <a:p>
-            <a:endParaRPr lang="en-GB" sz="1600" smtClean="0">
-              <a:solidFill>
-                <a:schemeClr val="tx1"/>
-              </a:solidFill>
-              <a:latin typeface="Gill Sans MT" panose="020B0502020104020203" pitchFamily="34" charset="0"/>
-            </a:endParaRPr>
-          </a:p>
-          <a:p>
-            <a:r>
-              <a:rPr lang="en-GB" sz="1600" smtClean="0">
-                <a:solidFill>
-                  <a:schemeClr val="tx1"/>
-                </a:solidFill>
-                <a:latin typeface="Gill Sans MT" panose="020B0502020104020203" pitchFamily="34" charset="0"/>
-              </a:rPr>
-              <a:t>Unix-like operating systems are everywhere, and you can control them through the shell.</a:t>
-            </a:r>
-          </a:p>
-          <a:p>
-            <a:endParaRPr lang="en-GB" sz="1600">
-              <a:solidFill>
-                <a:schemeClr val="tx1"/>
-              </a:solidFill>
-              <a:latin typeface="Gill Sans MT" panose="020B0502020104020203" pitchFamily="34" charset="0"/>
-            </a:endParaRPr>
-          </a:p>
-          <a:p>
-            <a:r>
-              <a:rPr lang="en-GB" sz="1600" smtClean="0">
-                <a:solidFill>
-                  <a:schemeClr val="tx1"/>
-                </a:solidFill>
-                <a:latin typeface="Gill Sans MT" panose="020B0502020104020203" pitchFamily="34" charset="0"/>
-              </a:rPr>
-              <a:t>The shell allows you to automate workflows and eliminate repetetive tasks.</a:t>
-            </a:r>
-          </a:p>
-          <a:p>
-            <a:endParaRPr lang="en-GB" sz="1600" smtClean="0">
-              <a:solidFill>
-                <a:schemeClr val="tx1"/>
-              </a:solidFill>
-              <a:latin typeface="Gill Sans MT" panose="020B0502020104020203" pitchFamily="34" charset="0"/>
-            </a:endParaRPr>
-          </a:p>
-          <a:p>
-            <a:r>
-              <a:rPr lang="en-GB" sz="1600" smtClean="0">
-                <a:solidFill>
-                  <a:schemeClr val="tx1"/>
-                </a:solidFill>
-                <a:latin typeface="Gill Sans MT" panose="020B0502020104020203" pitchFamily="34" charset="0"/>
-              </a:rPr>
-              <a:t>The shell is the natural route to other power tools like C, perl, R, &amp; Java.</a:t>
-            </a:r>
-          </a:p>
-          <a:p>
-            <a:endParaRPr lang="en-GB" sz="1600">
-              <a:solidFill>
-                <a:schemeClr val="tx1"/>
-              </a:solidFill>
-              <a:latin typeface="Gill Sans MT" panose="020B0502020104020203" pitchFamily="34" charset="0"/>
-            </a:endParaRPr>
-          </a:p>
-          <a:p>
-            <a:r>
-              <a:rPr lang="en-GB" sz="1600">
-                <a:solidFill>
-                  <a:schemeClr val="tx1"/>
-                </a:solidFill>
-                <a:latin typeface="Gill Sans MT" panose="020B0502020104020203" pitchFamily="34" charset="0"/>
-              </a:rPr>
-              <a:t>The shell is your gateway to the world’s supercomputers.</a:t>
-            </a:r>
-          </a:p>
-          <a:p>
-            <a:endParaRPr lang="en-GB" sz="1600">
-              <a:solidFill>
-                <a:srgbClr val="7030A0"/>
-              </a:solidFill>
-              <a:latin typeface="Century Gothic" panose="020B0502020202020204" pitchFamily="34" charset="0"/>
-            </a:endParaRPr>
-          </a:p>
-        </p:txBody>
-      </p:sp>
-    </p:spTree>
-    <p:extLst>
-      <p:ext uri="{BB962C8B-B14F-4D97-AF65-F5344CB8AC3E}">
-        <p14:creationId xmlns:p14="http://schemas.microsoft.com/office/powerpoint/2010/main" val="4019835561"/>
-      </p:ext>
-    </p:extLst>
-  </p:cSld>
-  <p:clrMapOvr>
-    <a:masterClrMapping/>
-  </p:clrMapOvr>
-  <p:timing>
-    <p:tnLst>
-      <p:par>
-        <p:cTn id="1" dur="indefinite" restart="never" nodeType="tmRoot"/>
-      </p:par>
-    </p:tnLst>
-  </p:timing>
-</p:sld>
-</file>
-
-<file path=ppt/slides/slide30.xml><?xml version="1.0" encoding="utf-8"?>
-<p:sld xmlns:a="http://schemas.openxmlformats.org/drawingml/2006/main" xmlns:r="http://schemas.openxmlformats.org/officeDocument/2006/relationships" xmlns:p="http://schemas.openxmlformats.org/presentationml/2006/main">
-  <p:cSld>
-    <p:spTree>
-      <p:nvGrpSpPr>
-        <p:cNvPr id="1" name=""/>
-        <p:cNvGrpSpPr/>
-        <p:nvPr/>
-      </p:nvGrpSpPr>
-      <p:grpSpPr>
-        <a:xfrm>
-          <a:off x="0" y="0"/>
-          <a:ext cx="0" cy="0"/>
-          <a:chOff x="0" y="0"/>
-          <a:chExt cx="0" cy="0"/>
-        </a:xfrm>
-      </p:grpSpPr>
-      <p:sp>
-        <p:nvSpPr>
-          <p:cNvPr id="4" name="Rectangle 3"/>
-          <p:cNvSpPr/>
-          <p:nvPr/>
-        </p:nvSpPr>
-        <p:spPr>
-          <a:xfrm>
-            <a:off x="2073000" y="549000"/>
-            <a:ext cx="5760000" cy="5760000"/>
-          </a:xfrm>
-          <a:prstGeom prst="rect">
-            <a:avLst/>
-          </a:prstGeom>
-          <a:solidFill>
-            <a:schemeClr val="bg1"/>
-          </a:solidFill>
-          <a:ln>
-            <a:solidFill>
-              <a:schemeClr val="tx2"/>
-            </a:solidFill>
-          </a:ln>
-          <a:effectLst>
-            <a:outerShdw blurRad="50800" dist="38100" dir="2700000" algn="tl" rotWithShape="0">
-              <a:prstClr val="black">
-                <a:alpha val="40000"/>
-              </a:prstClr>
-            </a:outerShdw>
-          </a:effectLst>
-        </p:spPr>
-        <p:style>
-          <a:lnRef idx="2">
-            <a:schemeClr val="accent1">
-              <a:shade val="50000"/>
-            </a:schemeClr>
-          </a:lnRef>
-          <a:fillRef idx="1">
-            <a:schemeClr val="accent1"/>
-          </a:fillRef>
-          <a:effectRef idx="0">
-            <a:schemeClr val="accent1"/>
-          </a:effectRef>
-          <a:fontRef idx="minor">
-            <a:schemeClr val="lt1"/>
-          </a:fontRef>
-        </p:style>
-        <p:txBody>
-          <a:bodyPr lIns="180000" tIns="180000" rIns="180000" bIns="180000" rtlCol="0" anchor="t"/>
-          <a:lstStyle/>
-          <a:p>
-            <a:r>
-              <a:rPr lang="en-GB" sz="2400" smtClean="0">
-                <a:solidFill>
-                  <a:srgbClr val="7030A0"/>
-                </a:solidFill>
-                <a:latin typeface="Century Gothic" panose="020B0502020202020204" pitchFamily="34" charset="0"/>
-              </a:rPr>
-              <a:t>Moving data, or yourself</a:t>
-            </a:r>
-            <a:endParaRPr lang="en-GB" sz="2400">
-              <a:solidFill>
-                <a:srgbClr val="7030A0"/>
-              </a:solidFill>
-              <a:latin typeface="Century Gothic" panose="020B0502020202020204" pitchFamily="34" charset="0"/>
-            </a:endParaRPr>
-          </a:p>
-          <a:p>
-            <a:endParaRPr lang="en-GB" sz="1600" smtClean="0">
-              <a:solidFill>
-                <a:schemeClr val="tx1"/>
-              </a:solidFill>
-              <a:latin typeface="Gill Sans MT" panose="020B0502020104020203" pitchFamily="34" charset="0"/>
-            </a:endParaRPr>
-          </a:p>
-          <a:p>
-            <a:r>
-              <a:rPr lang="en-GB" sz="1600" smtClean="0">
-                <a:solidFill>
-                  <a:schemeClr val="tx1"/>
-                </a:solidFill>
-                <a:latin typeface="Gill Sans MT" panose="020B0502020104020203" pitchFamily="34" charset="0"/>
-              </a:rPr>
-              <a:t>Most of the ways of moving data around the internet were developed for Unix first. You also have the option of going to where the data is, with a remote shell.</a:t>
-            </a:r>
-            <a:endParaRPr lang="en-GB" sz="1600">
-              <a:solidFill>
-                <a:srgbClr val="7030A0"/>
-              </a:solidFill>
-              <a:latin typeface="Century Gothic" panose="020B0502020202020204" pitchFamily="34" charset="0"/>
-            </a:endParaRPr>
-          </a:p>
-        </p:txBody>
-      </p:sp>
-      <p:pic>
-        <p:nvPicPr>
-          <p:cNvPr id="1026" name="Picture 2"/>
-          <p:cNvPicPr>
-            <a:picLocks noChangeAspect="1" noChangeArrowheads="1"/>
-          </p:cNvPicPr>
-          <p:nvPr/>
-        </p:nvPicPr>
-        <p:blipFill>
-          <a:blip r:embed="rId2" cstate="print">
-            <a:extLst>
-              <a:ext uri="{28A0092B-C50C-407E-A947-70E740481C1C}">
-                <a14:useLocalDpi xmlns:a14="http://schemas.microsoft.com/office/drawing/2010/main" val="0"/>
-              </a:ext>
-            </a:extLst>
-          </a:blip>
-          <a:srcRect/>
-          <a:stretch>
-            <a:fillRect/>
-          </a:stretch>
-        </p:blipFill>
-        <p:spPr bwMode="auto">
-          <a:xfrm>
-            <a:off x="2438401" y="2209800"/>
-            <a:ext cx="5177822" cy="3657600"/>
-          </a:xfrm>
-          <a:prstGeom prst="rect">
-            <a:avLst/>
-          </a:prstGeom>
-          <a:noFill/>
-          <a:ln>
-            <a:noFill/>
-          </a:ln>
-          <a:extLst>
-            <a:ext uri="{909E8E84-426E-40DD-AFC4-6F175D3DCCD1}">
-              <a14:hiddenFill xmlns:a14="http://schemas.microsoft.com/office/drawing/2010/main">
-                <a:solidFill>
-                  <a:schemeClr val="accent1"/>
-                </a:solidFill>
-              </a14:hiddenFill>
-            </a:ext>
-            <a:ext uri="{91240B29-F687-4F45-9708-019B960494DF}">
-              <a14:hiddenLine xmlns:a14="http://schemas.microsoft.com/office/drawing/2010/main" w="9525">
-                <a:solidFill>
-                  <a:schemeClr val="tx1"/>
-                </a:solidFill>
-                <a:miter lim="800000"/>
-                <a:headEnd/>
-                <a:tailEnd/>
-              </a14:hiddenLine>
-            </a:ext>
-          </a:extLst>
-        </p:spPr>
-      </p:pic>
-    </p:spTree>
-    <p:extLst>
-      <p:ext uri="{BB962C8B-B14F-4D97-AF65-F5344CB8AC3E}">
-        <p14:creationId xmlns:p14="http://schemas.microsoft.com/office/powerpoint/2010/main" val="54477602"/>
-      </p:ext>
-    </p:extLst>
-  </p:cSld>
-  <p:clrMapOvr>
-    <a:masterClrMapping/>
-  </p:clrMapOvr>
-  <p:timing>
-    <p:tnLst>
-      <p:par>
-        <p:cTn id="1" dur="indefinite" restart="never" nodeType="tmRoot"/>
-      </p:par>
-    </p:tnLst>
-  </p:timing>
-</p:sld>
-</file>
-
 <file path=ppt/slides/slide31.xml><?xml version="1.0" encoding="utf-8"?>
 <p:sld xmlns:a="http://schemas.openxmlformats.org/drawingml/2006/main" xmlns:r="http://schemas.openxmlformats.org/officeDocument/2006/relationships" xmlns:p="http://schemas.openxmlformats.org/presentationml/2006/main">
   <p:cSld>
@@ -12691,6 +12863,190 @@
                 </a:solidFill>
                 <a:latin typeface="Century Gothic" panose="020B0502020202020204" pitchFamily="34" charset="0"/>
               </a:rPr>
+              <a:t>Moving data, or yourself</a:t>
+            </a:r>
+            <a:endParaRPr lang="en-GB" sz="2400">
+              <a:solidFill>
+                <a:srgbClr val="7030A0"/>
+              </a:solidFill>
+              <a:latin typeface="Century Gothic" panose="020B0502020202020204" pitchFamily="34" charset="0"/>
+            </a:endParaRPr>
+          </a:p>
+          <a:p>
+            <a:endParaRPr lang="en-GB" sz="1600" smtClean="0">
+              <a:solidFill>
+                <a:schemeClr val="tx1"/>
+              </a:solidFill>
+              <a:latin typeface="Gill Sans MT" panose="020B0502020104020203" pitchFamily="34" charset="0"/>
+            </a:endParaRPr>
+          </a:p>
+          <a:p>
+            <a:r>
+              <a:rPr lang="en-GB" sz="1600" smtClean="0">
+                <a:solidFill>
+                  <a:schemeClr val="tx1"/>
+                </a:solidFill>
+                <a:latin typeface="Gill Sans MT" panose="020B0502020104020203" pitchFamily="34" charset="0"/>
+              </a:rPr>
+              <a:t>Most of the ways of moving data around the internet were developed for Unix first. You also have the option of going to where the data is, with a remote shell.</a:t>
+            </a:r>
+            <a:endParaRPr lang="en-GB" sz="1600">
+              <a:solidFill>
+                <a:srgbClr val="7030A0"/>
+              </a:solidFill>
+              <a:latin typeface="Century Gothic" panose="020B0502020202020204" pitchFamily="34" charset="0"/>
+            </a:endParaRPr>
+          </a:p>
+        </p:txBody>
+      </p:sp>
+      <p:pic>
+        <p:nvPicPr>
+          <p:cNvPr id="1026" name="Picture 2"/>
+          <p:cNvPicPr>
+            <a:picLocks noChangeAspect="1" noChangeArrowheads="1"/>
+          </p:cNvPicPr>
+          <p:nvPr/>
+        </p:nvPicPr>
+        <p:blipFill>
+          <a:blip r:embed="rId2" cstate="print">
+            <a:extLst>
+              <a:ext uri="{28A0092B-C50C-407E-A947-70E740481C1C}">
+                <a14:useLocalDpi xmlns:a14="http://schemas.microsoft.com/office/drawing/2010/main" val="0"/>
+              </a:ext>
+            </a:extLst>
+          </a:blip>
+          <a:srcRect/>
+          <a:stretch>
+            <a:fillRect/>
+          </a:stretch>
+        </p:blipFill>
+        <p:spPr bwMode="auto">
+          <a:xfrm>
+            <a:off x="2438401" y="2209800"/>
+            <a:ext cx="5177822" cy="3657600"/>
+          </a:xfrm>
+          <a:prstGeom prst="rect">
+            <a:avLst/>
+          </a:prstGeom>
+          <a:noFill/>
+          <a:ln>
+            <a:noFill/>
+          </a:ln>
+          <a:extLst>
+            <a:ext uri="{909E8E84-426E-40DD-AFC4-6F175D3DCCD1}">
+              <a14:hiddenFill xmlns:a14="http://schemas.microsoft.com/office/drawing/2010/main">
+                <a:solidFill>
+                  <a:schemeClr val="accent1"/>
+                </a:solidFill>
+              </a14:hiddenFill>
+            </a:ext>
+            <a:ext uri="{91240B29-F687-4F45-9708-019B960494DF}">
+              <a14:hiddenLine xmlns:a14="http://schemas.microsoft.com/office/drawing/2010/main" w="9525">
+                <a:solidFill>
+                  <a:schemeClr val="tx1"/>
+                </a:solidFill>
+                <a:miter lim="800000"/>
+                <a:headEnd/>
+                <a:tailEnd/>
+              </a14:hiddenLine>
+            </a:ext>
+          </a:extLst>
+        </p:spPr>
+      </p:pic>
+    </p:spTree>
+    <p:extLst>
+      <p:ext uri="{BB962C8B-B14F-4D97-AF65-F5344CB8AC3E}">
+        <p14:creationId xmlns:p14="http://schemas.microsoft.com/office/powerpoint/2010/main" val="54477602"/>
+      </p:ext>
+    </p:extLst>
+  </p:cSld>
+  <p:clrMapOvr>
+    <a:masterClrMapping/>
+  </p:clrMapOvr>
+  <p:timing>
+    <p:tnLst>
+      <p:par>
+        <p:cTn id="1" dur="indefinite" restart="never" nodeType="tmRoot"/>
+      </p:par>
+    </p:tnLst>
+  </p:timing>
+</p:sld>
+</file>
+
+<file path=ppt/slides/slide32.xml><?xml version="1.0" encoding="utf-8"?>
+<p:sld xmlns:a="http://schemas.openxmlformats.org/drawingml/2006/main" xmlns:r="http://schemas.openxmlformats.org/officeDocument/2006/relationships" xmlns:p="http://schemas.openxmlformats.org/presentationml/2006/main">
+  <p:cSld>
+    <p:spTree>
+      <p:nvGrpSpPr>
+        <p:cNvPr id="1" name=""/>
+        <p:cNvGrpSpPr/>
+        <p:nvPr/>
+      </p:nvGrpSpPr>
+      <p:grpSpPr>
+        <a:xfrm>
+          <a:off x="0" y="0"/>
+          <a:ext cx="0" cy="0"/>
+          <a:chOff x="0" y="0"/>
+          <a:chExt cx="0" cy="0"/>
+        </a:xfrm>
+      </p:grpSpPr>
+      <p:sp>
+        <p:nvSpPr>
+          <p:cNvPr id="4" name="Rectangle 3"/>
+          <p:cNvSpPr/>
+          <p:nvPr/>
+        </p:nvSpPr>
+        <p:spPr>
+          <a:xfrm>
+            <a:off x="2073000" y="549000"/>
+            <a:ext cx="5760000" cy="5760000"/>
+          </a:xfrm>
+          <a:prstGeom prst="rect">
+            <a:avLst/>
+          </a:prstGeom>
+          <a:solidFill>
+            <a:schemeClr val="bg1"/>
+          </a:solidFill>
+          <a:ln>
+            <a:solidFill>
+              <a:schemeClr val="tx2"/>
+            </a:solidFill>
+          </a:ln>
+          <a:effectLst>
+            <a:outerShdw blurRad="50800" dist="38100" dir="2700000" algn="tl" rotWithShape="0">
+              <a:prstClr val="black">
+                <a:alpha val="40000"/>
+              </a:prstClr>
+            </a:outerShdw>
+          </a:effectLst>
+        </p:spPr>
+        <p:style>
+          <a:lnRef idx="2">
+            <a:schemeClr val="accent1">
+              <a:shade val="50000"/>
+            </a:schemeClr>
+          </a:lnRef>
+          <a:fillRef idx="1">
+            <a:schemeClr val="accent1"/>
+          </a:fillRef>
+          <a:effectRef idx="0">
+            <a:schemeClr val="accent1"/>
+          </a:effectRef>
+          <a:fontRef idx="minor">
+            <a:schemeClr val="lt1"/>
+          </a:fontRef>
+        </p:style>
+        <p:txBody>
+          <a:bodyPr lIns="180000" tIns="180000" rIns="180000" bIns="180000" rtlCol="0" anchor="t"/>
+          <a:lstStyle/>
+          <a:p>
+            <a:r>
+              <a:rPr lang="en-GB" sz="2400" smtClean="0">
+                <a:solidFill>
+                  <a:srgbClr val="7030A0"/>
+                </a:solidFill>
+                <a:latin typeface="Century Gothic" panose="020B0502020202020204" pitchFamily="34" charset="0"/>
+              </a:rPr>
               <a:t>Shell programming</a:t>
             </a:r>
           </a:p>
@@ -12925,7 +13281,7 @@
 </p:sld>
 </file>
 
-<file path=ppt/slides/slide32.xml><?xml version="1.0" encoding="utf-8"?>
+<file path=ppt/slides/slide33.xml><?xml version="1.0" encoding="utf-8"?>
 <p:sld xmlns:a="http://schemas.openxmlformats.org/drawingml/2006/main" xmlns:r="http://schemas.openxmlformats.org/officeDocument/2006/relationships" xmlns:p="http://schemas.openxmlformats.org/presentationml/2006/main">
   <p:cSld>
     <p:spTree>
@@ -13144,7 +13500,7 @@
 </p:sld>
 </file>
 
-<file path=ppt/slides/slide33.xml><?xml version="1.0" encoding="utf-8"?>
+<file path=ppt/slides/slide34.xml><?xml version="1.0" encoding="utf-8"?>
 <p:sld xmlns:a="http://schemas.openxmlformats.org/drawingml/2006/main" xmlns:r="http://schemas.openxmlformats.org/officeDocument/2006/relationships" xmlns:p="http://schemas.openxmlformats.org/presentationml/2006/main">
   <p:cSld>
     <p:spTree>
@@ -13598,7 +13954,7 @@
 </p:sld>
 </file>
 
-<file path=ppt/slides/slide34.xml><?xml version="1.0" encoding="utf-8"?>
+<file path=ppt/slides/slide35.xml><?xml version="1.0" encoding="utf-8"?>
 <p:sld xmlns:a="http://schemas.openxmlformats.org/drawingml/2006/main" xmlns:r="http://schemas.openxmlformats.org/officeDocument/2006/relationships" xmlns:p="http://schemas.openxmlformats.org/presentationml/2006/main">
   <p:cSld>
     <p:spTree>
@@ -14040,7 +14396,7 @@
 </p:sld>
 </file>
 
-<file path=ppt/slides/slide35.xml><?xml version="1.0" encoding="utf-8"?>
+<file path=ppt/slides/slide36.xml><?xml version="1.0" encoding="utf-8"?>
 <p:sld xmlns:a="http://schemas.openxmlformats.org/drawingml/2006/main" xmlns:r="http://schemas.openxmlformats.org/officeDocument/2006/relationships" xmlns:p="http://schemas.openxmlformats.org/presentationml/2006/main">
   <p:cSld>
     <p:spTree>
@@ -14472,7 +14828,7 @@
 </p:sld>
 </file>
 
-<file path=ppt/slides/slide36.xml><?xml version="1.0" encoding="utf-8"?>
+<file path=ppt/slides/slide37.xml><?xml version="1.0" encoding="utf-8"?>
 <p:sld xmlns:a="http://schemas.openxmlformats.org/drawingml/2006/main" xmlns:r="http://schemas.openxmlformats.org/officeDocument/2006/relationships" xmlns:p="http://schemas.openxmlformats.org/presentationml/2006/main">
   <p:cSld>
     <p:spTree>
@@ -17991,6 +18347,23 @@
 </file>
 
 <file path=customXml/item1.xml><?xml version="1.0" encoding="utf-8"?>
+<p:properties xmlns:p="http://schemas.microsoft.com/office/2006/metadata/properties" xmlns:xsi="http://www.w3.org/2001/XMLSchema-instance" xmlns:pc="http://schemas.microsoft.com/office/infopath/2007/PartnerControls">
+  <documentManagement>
+    <Status xmlns="d388b689-ae8c-4832-ab62-a1effc01fe65">Open</Status>
+  </documentManagement>
+</p:properties>
+</file>
+
+<file path=customXml/item2.xml><?xml version="1.0" encoding="utf-8"?>
+<?mso-contentType ?>
+<FormTemplates xmlns="http://schemas.microsoft.com/sharepoint/v3/contenttype/forms">
+  <Display>DocumentLibraryForm</Display>
+  <Edit>DocumentLibraryForm</Edit>
+  <New>DocumentLibraryForm</New>
+</FormTemplates>
+</file>
+
+<file path=customXml/item3.xml><?xml version="1.0" encoding="utf-8"?>
 <ct:contentTypeSchema xmlns:ct="http://schemas.microsoft.com/office/2006/metadata/contentType" xmlns:ma="http://schemas.microsoft.com/office/2006/metadata/properties/metaAttributes" ct:_="" ma:_="" ma:contentTypeName="Document" ma:contentTypeID="0x010100399AE271D451684D9D736CEC4E0F6B9B" ma:contentTypeVersion="1" ma:contentTypeDescription="Create a new document." ma:contentTypeScope="" ma:versionID="7478ac634dabc1fe1d7055a9f6a8172b">
   <xsd:schema xmlns:xsd="http://www.w3.org/2001/XMLSchema" xmlns:xs="http://www.w3.org/2001/XMLSchema" xmlns:p="http://schemas.microsoft.com/office/2006/metadata/properties" xmlns:ns2="d388b689-ae8c-4832-ab62-a1effc01fe65" targetNamespace="http://schemas.microsoft.com/office/2006/metadata/properties" ma:root="true" ma:fieldsID="a2d5405f76c2b24e702fbe27fb2c681e" ns2:_="">
     <xsd:import namespace="d388b689-ae8c-4832-ab62-a1effc01fe65"/>
@@ -18119,24 +18492,31 @@
 </ct:contentTypeSchema>
 </file>
 
-<file path=customXml/item2.xml><?xml version="1.0" encoding="utf-8"?>
-<?mso-contentType ?>
-<FormTemplates xmlns="http://schemas.microsoft.com/sharepoint/v3/contenttype/forms">
-  <Display>DocumentLibraryForm</Display>
-  <Edit>DocumentLibraryForm</Edit>
-  <New>DocumentLibraryForm</New>
-</FormTemplates>
+<file path=customXml/itemProps1.xml><?xml version="1.0" encoding="utf-8"?>
+<ds:datastoreItem xmlns:ds="http://schemas.openxmlformats.org/officeDocument/2006/customXml" ds:itemID="{DFF48981-6DC9-4E7E-8946-5074F416BA11}">
+  <ds:schemaRefs>
+    <ds:schemaRef ds:uri="http://schemas.microsoft.com/office/2006/documentManagement/types"/>
+    <ds:schemaRef ds:uri="http://www.w3.org/XML/1998/namespace"/>
+    <ds:schemaRef ds:uri="http://purl.org/dc/elements/1.1/"/>
+    <ds:schemaRef ds:uri="http://purl.org/dc/dcmitype/"/>
+    <ds:schemaRef ds:uri="http://schemas.microsoft.com/office/infopath/2007/PartnerControls"/>
+    <ds:schemaRef ds:uri="http://purl.org/dc/terms/"/>
+    <ds:schemaRef ds:uri="http://schemas.openxmlformats.org/package/2006/metadata/core-properties"/>
+    <ds:schemaRef ds:uri="d388b689-ae8c-4832-ab62-a1effc01fe65"/>
+    <ds:schemaRef ds:uri="http://schemas.microsoft.com/office/2006/metadata/properties"/>
+  </ds:schemaRefs>
+</ds:datastoreItem>
 </file>
 
-<file path=customXml/item3.xml><?xml version="1.0" encoding="utf-8"?>
-<p:properties xmlns:p="http://schemas.microsoft.com/office/2006/metadata/properties" xmlns:xsi="http://www.w3.org/2001/XMLSchema-instance" xmlns:pc="http://schemas.microsoft.com/office/infopath/2007/PartnerControls">
-  <documentManagement>
-    <Status xmlns="d388b689-ae8c-4832-ab62-a1effc01fe65">Open</Status>
-  </documentManagement>
-</p:properties>
+<file path=customXml/itemProps2.xml><?xml version="1.0" encoding="utf-8"?>
+<ds:datastoreItem xmlns:ds="http://schemas.openxmlformats.org/officeDocument/2006/customXml" ds:itemID="{EF1B997E-C284-4939-9C45-B22995289D6D}">
+  <ds:schemaRefs>
+    <ds:schemaRef ds:uri="http://schemas.microsoft.com/sharepoint/v3/contenttype/forms"/>
+  </ds:schemaRefs>
+</ds:datastoreItem>
 </file>
 
-<file path=customXml/itemProps1.xml><?xml version="1.0" encoding="utf-8"?>
+<file path=customXml/itemProps3.xml><?xml version="1.0" encoding="utf-8"?>
 <ds:datastoreItem xmlns:ds="http://schemas.openxmlformats.org/officeDocument/2006/customXml" ds:itemID="{35F9377A-59D8-442A-B92A-17668B7E3A79}">
   <ds:schemaRefs>
     <ds:schemaRef ds:uri="http://schemas.microsoft.com/office/2006/metadata/contentType"/>
@@ -18152,28 +18532,4 @@
     <ds:schemaRef ds:uri="http://schemas.microsoft.com/internal/obd"/>
   </ds:schemaRefs>
 </ds:datastoreItem>
-</file>
-
-<file path=customXml/itemProps2.xml><?xml version="1.0" encoding="utf-8"?>
-<ds:datastoreItem xmlns:ds="http://schemas.openxmlformats.org/officeDocument/2006/customXml" ds:itemID="{EF1B997E-C284-4939-9C45-B22995289D6D}">
-  <ds:schemaRefs>
-    <ds:schemaRef ds:uri="http://schemas.microsoft.com/sharepoint/v3/contenttype/forms"/>
-  </ds:schemaRefs>
-</ds:datastoreItem>
-</file>
-
-<file path=customXml/itemProps3.xml><?xml version="1.0" encoding="utf-8"?>
-<ds:datastoreItem xmlns:ds="http://schemas.openxmlformats.org/officeDocument/2006/customXml" ds:itemID="{DFF48981-6DC9-4E7E-8946-5074F416BA11}">
-  <ds:schemaRefs>
-    <ds:schemaRef ds:uri="d388b689-ae8c-4832-ab62-a1effc01fe65"/>
-    <ds:schemaRef ds:uri="http://schemas.microsoft.com/office/2006/documentManagement/types"/>
-    <ds:schemaRef ds:uri="http://purl.org/dc/dcmitype/"/>
-    <ds:schemaRef ds:uri="http://schemas.openxmlformats.org/package/2006/metadata/core-properties"/>
-    <ds:schemaRef ds:uri="http://purl.org/dc/terms/"/>
-    <ds:schemaRef ds:uri="http://schemas.microsoft.com/office/2006/metadata/properties"/>
-    <ds:schemaRef ds:uri="http://purl.org/dc/elements/1.1/"/>
-    <ds:schemaRef ds:uri="http://www.w3.org/XML/1998/namespace"/>
-    <ds:schemaRef ds:uri="http://schemas.microsoft.com/office/infopath/2007/PartnerControls"/>
-  </ds:schemaRefs>
-</ds:datastoreItem>
 </file>
</xml_diff>